<commit_message>
finale Änderungen für Abgabe
</commit_message>
<xml_diff>
--- a/DevSecOps-Präsentation.pptx
+++ b/DevSecOps-Präsentation.pptx
@@ -5,31 +5,34 @@
     <p:sldMasterId id="2147483672" r:id="rId1"/>
   </p:sldMasterIdLst>
   <p:notesMasterIdLst>
-    <p:notesMasterId r:id="rId24"/>
+    <p:notesMasterId r:id="rId27"/>
   </p:notesMasterIdLst>
   <p:sldIdLst>
     <p:sldId id="256" r:id="rId2"/>
-    <p:sldId id="257" r:id="rId3"/>
-    <p:sldId id="258" r:id="rId4"/>
-    <p:sldId id="259" r:id="rId5"/>
-    <p:sldId id="260" r:id="rId6"/>
-    <p:sldId id="261" r:id="rId7"/>
-    <p:sldId id="262" r:id="rId8"/>
-    <p:sldId id="263" r:id="rId9"/>
-    <p:sldId id="265" r:id="rId10"/>
-    <p:sldId id="264" r:id="rId11"/>
-    <p:sldId id="277" r:id="rId12"/>
-    <p:sldId id="266" r:id="rId13"/>
-    <p:sldId id="268" r:id="rId14"/>
-    <p:sldId id="267" r:id="rId15"/>
-    <p:sldId id="270" r:id="rId16"/>
-    <p:sldId id="271" r:id="rId17"/>
-    <p:sldId id="272" r:id="rId18"/>
-    <p:sldId id="274" r:id="rId19"/>
-    <p:sldId id="275" r:id="rId20"/>
-    <p:sldId id="273" r:id="rId21"/>
-    <p:sldId id="276" r:id="rId22"/>
-    <p:sldId id="278" r:id="rId23"/>
+    <p:sldId id="279" r:id="rId3"/>
+    <p:sldId id="281" r:id="rId4"/>
+    <p:sldId id="257" r:id="rId5"/>
+    <p:sldId id="258" r:id="rId6"/>
+    <p:sldId id="259" r:id="rId7"/>
+    <p:sldId id="260" r:id="rId8"/>
+    <p:sldId id="261" r:id="rId9"/>
+    <p:sldId id="262" r:id="rId10"/>
+    <p:sldId id="263" r:id="rId11"/>
+    <p:sldId id="266" r:id="rId12"/>
+    <p:sldId id="265" r:id="rId13"/>
+    <p:sldId id="264" r:id="rId14"/>
+    <p:sldId id="277" r:id="rId15"/>
+    <p:sldId id="268" r:id="rId16"/>
+    <p:sldId id="267" r:id="rId17"/>
+    <p:sldId id="270" r:id="rId18"/>
+    <p:sldId id="271" r:id="rId19"/>
+    <p:sldId id="272" r:id="rId20"/>
+    <p:sldId id="280" r:id="rId21"/>
+    <p:sldId id="274" r:id="rId22"/>
+    <p:sldId id="275" r:id="rId23"/>
+    <p:sldId id="273" r:id="rId24"/>
+    <p:sldId id="276" r:id="rId25"/>
+    <p:sldId id="278" r:id="rId26"/>
   </p:sldIdLst>
   <p:sldSz cx="12192000" cy="6858000"/>
   <p:notesSz cx="6858000" cy="9144000"/>
@@ -221,7 +224,7 @@
           <a:p>
             <a:fld id="{13BF8AD4-1D47-4049-AEE2-D51502B55949}" type="datetimeFigureOut">
               <a:rPr lang="de-DE" smtClean="0"/>
-              <a:t>05.07.2022</a:t>
+              <a:t>06.07.2022</a:t>
             </a:fld>
             <a:endParaRPr lang="de-DE"/>
           </a:p>
@@ -562,7 +565,7 @@
           <a:p>
             <a:fld id="{49992543-191D-44F5-8CE4-61B0EA910F24}" type="slidenum">
               <a:rPr lang="de-DE" smtClean="0"/>
-              <a:t>4</a:t>
+              <a:t>6</a:t>
             </a:fld>
             <a:endParaRPr lang="de-DE"/>
           </a:p>
@@ -674,7 +677,7 @@
           <a:p>
             <a:fld id="{49992543-191D-44F5-8CE4-61B0EA910F24}" type="slidenum">
               <a:rPr lang="de-DE" smtClean="0"/>
-              <a:t>8</a:t>
+              <a:t>10</a:t>
             </a:fld>
             <a:endParaRPr lang="de-DE"/>
           </a:p>
@@ -804,7 +807,7 @@
           <a:p>
             <a:fld id="{49992543-191D-44F5-8CE4-61B0EA910F24}" type="slidenum">
               <a:rPr lang="de-DE" smtClean="0"/>
-              <a:t>21</a:t>
+              <a:t>24</a:t>
             </a:fld>
             <a:endParaRPr lang="de-DE"/>
           </a:p>
@@ -9616,7 +9619,7 @@
           <a:p>
             <a:fld id="{04A2BC73-CF7A-46DC-A614-B1C8166B4D4E}" type="datetimeFigureOut">
               <a:rPr lang="de-DE" smtClean="0"/>
-              <a:t>05.07.2022</a:t>
+              <a:t>06.07.2022</a:t>
             </a:fld>
             <a:endParaRPr lang="de-DE"/>
           </a:p>
@@ -9823,7 +9826,7 @@
           <a:p>
             <a:fld id="{04A2BC73-CF7A-46DC-A614-B1C8166B4D4E}" type="datetimeFigureOut">
               <a:rPr lang="de-DE" smtClean="0"/>
-              <a:t>05.07.2022</a:t>
+              <a:t>06.07.2022</a:t>
             </a:fld>
             <a:endParaRPr lang="de-DE"/>
           </a:p>
@@ -10003,7 +10006,7 @@
           <a:p>
             <a:fld id="{04A2BC73-CF7A-46DC-A614-B1C8166B4D4E}" type="datetimeFigureOut">
               <a:rPr lang="de-DE" smtClean="0"/>
-              <a:t>05.07.2022</a:t>
+              <a:t>06.07.2022</a:t>
             </a:fld>
             <a:endParaRPr lang="de-DE"/>
           </a:p>
@@ -10208,7 +10211,7 @@
           <a:p>
             <a:fld id="{04A2BC73-CF7A-46DC-A614-B1C8166B4D4E}" type="datetimeFigureOut">
               <a:rPr lang="de-DE" smtClean="0"/>
-              <a:t>05.07.2022</a:t>
+              <a:t>06.07.2022</a:t>
             </a:fld>
             <a:endParaRPr lang="de-DE"/>
           </a:p>
@@ -19106,7 +19109,7 @@
           <a:p>
             <a:fld id="{04A2BC73-CF7A-46DC-A614-B1C8166B4D4E}" type="datetimeFigureOut">
               <a:rPr lang="de-DE" smtClean="0"/>
-              <a:t>05.07.2022</a:t>
+              <a:t>06.07.2022</a:t>
             </a:fld>
             <a:endParaRPr lang="de-DE"/>
           </a:p>
@@ -19380,7 +19383,7 @@
           <a:p>
             <a:fld id="{04A2BC73-CF7A-46DC-A614-B1C8166B4D4E}" type="datetimeFigureOut">
               <a:rPr lang="de-DE" smtClean="0"/>
-              <a:t>05.07.2022</a:t>
+              <a:t>06.07.2022</a:t>
             </a:fld>
             <a:endParaRPr lang="de-DE"/>
           </a:p>
@@ -19778,7 +19781,7 @@
           <a:p>
             <a:fld id="{04A2BC73-CF7A-46DC-A614-B1C8166B4D4E}" type="datetimeFigureOut">
               <a:rPr lang="de-DE" smtClean="0"/>
-              <a:t>05.07.2022</a:t>
+              <a:t>06.07.2022</a:t>
             </a:fld>
             <a:endParaRPr lang="de-DE"/>
           </a:p>
@@ -19896,7 +19899,7 @@
           <a:p>
             <a:fld id="{04A2BC73-CF7A-46DC-A614-B1C8166B4D4E}" type="datetimeFigureOut">
               <a:rPr lang="de-DE" smtClean="0"/>
-              <a:t>05.07.2022</a:t>
+              <a:t>06.07.2022</a:t>
             </a:fld>
             <a:endParaRPr lang="de-DE"/>
           </a:p>
@@ -19991,7 +19994,7 @@
           <a:p>
             <a:fld id="{04A2BC73-CF7A-46DC-A614-B1C8166B4D4E}" type="datetimeFigureOut">
               <a:rPr lang="de-DE" smtClean="0"/>
-              <a:t>05.07.2022</a:t>
+              <a:t>06.07.2022</a:t>
             </a:fld>
             <a:endParaRPr lang="de-DE"/>
           </a:p>
@@ -20281,7 +20284,7 @@
           <a:p>
             <a:fld id="{04A2BC73-CF7A-46DC-A614-B1C8166B4D4E}" type="datetimeFigureOut">
               <a:rPr lang="de-DE" smtClean="0"/>
-              <a:t>05.07.2022</a:t>
+              <a:t>06.07.2022</a:t>
             </a:fld>
             <a:endParaRPr lang="de-DE"/>
           </a:p>
@@ -20561,7 +20564,7 @@
           <a:p>
             <a:fld id="{04A2BC73-CF7A-46DC-A614-B1C8166B4D4E}" type="datetimeFigureOut">
               <a:rPr lang="de-DE" smtClean="0"/>
-              <a:t>05.07.2022</a:t>
+              <a:t>06.07.2022</a:t>
             </a:fld>
             <a:endParaRPr lang="de-DE"/>
           </a:p>
@@ -20811,7 +20814,7 @@
           <a:p>
             <a:fld id="{04A2BC73-CF7A-46DC-A614-B1C8166B4D4E}" type="datetimeFigureOut">
               <a:rPr lang="de-DE" smtClean="0"/>
-              <a:t>05.07.2022</a:t>
+              <a:t>06.07.2022</a:t>
             </a:fld>
             <a:endParaRPr lang="de-DE"/>
           </a:p>
@@ -21344,14 +21347,6 @@
             </a:r>
             <a:r>
               <a:rPr lang="de-DE" dirty="0" smtClean="0"/>
-              <a:t> </a:t>
-            </a:r>
-            <a:r>
-              <a:rPr lang="de-DE" dirty="0" err="1" smtClean="0"/>
-              <a:t>DevOps</a:t>
-            </a:r>
-            <a:r>
-              <a:rPr lang="de-DE" dirty="0" smtClean="0"/>
               <a:t> Pipelines und </a:t>
             </a:r>
             <a:r>
@@ -21399,10 +21394,542 @@
   <p:clrMapOvr>
     <a:masterClrMapping/>
   </p:clrMapOvr>
+  <p:timing>
+    <p:tnLst>
+      <p:par>
+        <p:cTn id="1" dur="indefinite" restart="never" nodeType="tmRoot"/>
+      </p:par>
+    </p:tnLst>
+  </p:timing>
 </p:sld>
 </file>
 
 <file path=ppt/slides/slide10.xml><?xml version="1.0" encoding="utf-8"?>
+<p:sld xmlns:a="http://schemas.openxmlformats.org/drawingml/2006/main" xmlns:r="http://schemas.openxmlformats.org/officeDocument/2006/relationships" xmlns:p="http://schemas.openxmlformats.org/presentationml/2006/main">
+  <p:cSld>
+    <p:spTree>
+      <p:nvGrpSpPr>
+        <p:cNvPr id="1" name=""/>
+        <p:cNvGrpSpPr/>
+        <p:nvPr/>
+      </p:nvGrpSpPr>
+      <p:grpSpPr>
+        <a:xfrm>
+          <a:off x="0" y="0"/>
+          <a:ext cx="0" cy="0"/>
+          <a:chOff x="0" y="0"/>
+          <a:chExt cx="0" cy="0"/>
+        </a:xfrm>
+      </p:grpSpPr>
+      <p:sp>
+        <p:nvSpPr>
+          <p:cNvPr id="4" name="Titel 3"/>
+          <p:cNvSpPr>
+            <a:spLocks noGrp="1"/>
+          </p:cNvSpPr>
+          <p:nvPr>
+            <p:ph type="title"/>
+          </p:nvPr>
+        </p:nvSpPr>
+        <p:spPr/>
+        <p:txBody>
+          <a:bodyPr/>
+          <a:lstStyle/>
+          <a:p>
+            <a:r>
+              <a:rPr lang="de-DE" dirty="0" smtClean="0"/>
+              <a:t>Security in </a:t>
+            </a:r>
+            <a:r>
+              <a:rPr lang="de-DE" dirty="0" err="1" smtClean="0"/>
+              <a:t>Github</a:t>
+            </a:r>
+            <a:endParaRPr lang="de-DE" dirty="0"/>
+          </a:p>
+        </p:txBody>
+      </p:sp>
+      <p:pic>
+        <p:nvPicPr>
+          <p:cNvPr id="2" name="Grafik 1"/>
+          <p:cNvPicPr>
+            <a:picLocks noChangeAspect="1"/>
+          </p:cNvPicPr>
+          <p:nvPr/>
+        </p:nvPicPr>
+        <p:blipFill>
+          <a:blip r:embed="rId3">
+            <a:extLst>
+              <a:ext uri="{28A0092B-C50C-407E-A947-70E740481C1C}">
+                <a14:useLocalDpi xmlns:a14="http://schemas.microsoft.com/office/drawing/2010/main" val="0"/>
+              </a:ext>
+            </a:extLst>
+          </a:blip>
+          <a:stretch>
+            <a:fillRect/>
+          </a:stretch>
+        </p:blipFill>
+        <p:spPr>
+          <a:xfrm>
+            <a:off x="1514625" y="870007"/>
+            <a:ext cx="8739078" cy="6752924"/>
+          </a:xfrm>
+          <a:prstGeom prst="rect">
+            <a:avLst/>
+          </a:prstGeom>
+        </p:spPr>
+      </p:pic>
+    </p:spTree>
+    <p:extLst>
+      <p:ext uri="{BB962C8B-B14F-4D97-AF65-F5344CB8AC3E}">
+        <p14:creationId xmlns:p14="http://schemas.microsoft.com/office/powerpoint/2010/main" val="1077076356"/>
+      </p:ext>
+    </p:extLst>
+  </p:cSld>
+  <p:clrMapOvr>
+    <a:masterClrMapping/>
+  </p:clrMapOvr>
+  <p:timing>
+    <p:tnLst>
+      <p:par>
+        <p:cTn id="1" dur="indefinite" restart="never" nodeType="tmRoot"/>
+      </p:par>
+    </p:tnLst>
+  </p:timing>
+</p:sld>
+</file>
+
+<file path=ppt/slides/slide11.xml><?xml version="1.0" encoding="utf-8"?>
+<p:sld xmlns:a="http://schemas.openxmlformats.org/drawingml/2006/main" xmlns:r="http://schemas.openxmlformats.org/officeDocument/2006/relationships" xmlns:p="http://schemas.openxmlformats.org/presentationml/2006/main">
+  <p:cSld>
+    <p:spTree>
+      <p:nvGrpSpPr>
+        <p:cNvPr id="1" name=""/>
+        <p:cNvGrpSpPr/>
+        <p:nvPr/>
+      </p:nvGrpSpPr>
+      <p:grpSpPr>
+        <a:xfrm>
+          <a:off x="0" y="0"/>
+          <a:ext cx="0" cy="0"/>
+          <a:chOff x="0" y="0"/>
+          <a:chExt cx="0" cy="0"/>
+        </a:xfrm>
+      </p:grpSpPr>
+      <p:sp>
+        <p:nvSpPr>
+          <p:cNvPr id="2" name="Titel 1"/>
+          <p:cNvSpPr>
+            <a:spLocks noGrp="1"/>
+          </p:cNvSpPr>
+          <p:nvPr>
+            <p:ph type="title"/>
+          </p:nvPr>
+        </p:nvSpPr>
+        <p:spPr/>
+        <p:txBody>
+          <a:bodyPr/>
+          <a:lstStyle/>
+          <a:p>
+            <a:r>
+              <a:rPr lang="de-DE" dirty="0" err="1" smtClean="0"/>
+              <a:t>codespaces</a:t>
+            </a:r>
+            <a:endParaRPr lang="de-DE" dirty="0"/>
+          </a:p>
+        </p:txBody>
+      </p:sp>
+      <p:sp>
+        <p:nvSpPr>
+          <p:cNvPr id="3" name="Inhaltsplatzhalter 2"/>
+          <p:cNvSpPr>
+            <a:spLocks noGrp="1"/>
+          </p:cNvSpPr>
+          <p:nvPr>
+            <p:ph idx="1"/>
+          </p:nvPr>
+        </p:nvSpPr>
+        <p:spPr/>
+        <p:txBody>
+          <a:bodyPr/>
+          <a:lstStyle/>
+          <a:p>
+            <a:pPr>
+              <a:buFont typeface="Wingdings" panose="05000000000000000000" pitchFamily="2" charset="2"/>
+              <a:buChar char="v"/>
+            </a:pPr>
+            <a:r>
+              <a:rPr lang="de-DE" dirty="0" smtClean="0"/>
+              <a:t> Softwareentwicklungsumgebung in der Cloud</a:t>
+            </a:r>
+          </a:p>
+          <a:p>
+            <a:pPr>
+              <a:buFont typeface="Wingdings" panose="05000000000000000000" pitchFamily="2" charset="2"/>
+              <a:buChar char="v"/>
+            </a:pPr>
+            <a:r>
+              <a:rPr lang="de-DE" dirty="0"/>
+              <a:t> </a:t>
+            </a:r>
+            <a:r>
+              <a:rPr lang="de-DE" dirty="0" smtClean="0"/>
+              <a:t>Nutzung von Visual Studio Code mit Terminal und Debugger</a:t>
+            </a:r>
+          </a:p>
+          <a:p>
+            <a:pPr>
+              <a:buFont typeface="Wingdings" panose="05000000000000000000" pitchFamily="2" charset="2"/>
+              <a:buChar char="v"/>
+            </a:pPr>
+            <a:r>
+              <a:rPr lang="de-DE" dirty="0"/>
+              <a:t> </a:t>
+            </a:r>
+            <a:r>
+              <a:rPr lang="de-DE" dirty="0" smtClean="0"/>
+              <a:t>Gute Skalierbarkeit und Standardisierung</a:t>
+            </a:r>
+          </a:p>
+          <a:p>
+            <a:pPr>
+              <a:buFont typeface="Wingdings" panose="05000000000000000000" pitchFamily="2" charset="2"/>
+              <a:buChar char="v"/>
+            </a:pPr>
+            <a:r>
+              <a:rPr lang="de-DE" dirty="0" smtClean="0"/>
+              <a:t> Visual Studio Code bietet viele Security Scanning Erweiterungen</a:t>
+            </a:r>
+          </a:p>
+          <a:p>
+            <a:pPr>
+              <a:buFont typeface="Wingdings" panose="05000000000000000000" pitchFamily="2" charset="2"/>
+              <a:buChar char="v"/>
+            </a:pPr>
+            <a:r>
+              <a:rPr lang="de-DE" dirty="0"/>
+              <a:t> </a:t>
+            </a:r>
+            <a:r>
+              <a:rPr lang="de-DE" dirty="0" smtClean="0"/>
+              <a:t>Nachverfolgung durch Security Logs </a:t>
+            </a:r>
+          </a:p>
+          <a:p>
+            <a:pPr>
+              <a:buFont typeface="Wingdings" panose="05000000000000000000" pitchFamily="2" charset="2"/>
+              <a:buChar char="v"/>
+            </a:pPr>
+            <a:r>
+              <a:rPr lang="de-DE" dirty="0"/>
+              <a:t> </a:t>
+            </a:r>
+            <a:r>
+              <a:rPr lang="de-DE" dirty="0" smtClean="0"/>
+              <a:t>Verschlüsseltes Speichern von Umgebungsvariablen/</a:t>
+            </a:r>
+            <a:r>
+              <a:rPr lang="de-DE" dirty="0" err="1" smtClean="0"/>
+              <a:t>Secrets</a:t>
+            </a:r>
+            <a:endParaRPr lang="de-DE" dirty="0"/>
+          </a:p>
+        </p:txBody>
+      </p:sp>
+    </p:spTree>
+    <p:extLst>
+      <p:ext uri="{BB962C8B-B14F-4D97-AF65-F5344CB8AC3E}">
+        <p14:creationId xmlns:p14="http://schemas.microsoft.com/office/powerpoint/2010/main" val="2544807765"/>
+      </p:ext>
+    </p:extLst>
+  </p:cSld>
+  <p:clrMapOvr>
+    <a:masterClrMapping/>
+  </p:clrMapOvr>
+  <p:timing>
+    <p:tnLst>
+      <p:par>
+        <p:cTn id="1" dur="indefinite" restart="never" nodeType="tmRoot"/>
+      </p:par>
+    </p:tnLst>
+  </p:timing>
+</p:sld>
+</file>
+
+<file path=ppt/slides/slide12.xml><?xml version="1.0" encoding="utf-8"?>
+<p:sld xmlns:a="http://schemas.openxmlformats.org/drawingml/2006/main" xmlns:r="http://schemas.openxmlformats.org/officeDocument/2006/relationships" xmlns:p="http://schemas.openxmlformats.org/presentationml/2006/main">
+  <p:cSld>
+    <p:spTree>
+      <p:nvGrpSpPr>
+        <p:cNvPr id="1" name=""/>
+        <p:cNvGrpSpPr/>
+        <p:nvPr/>
+      </p:nvGrpSpPr>
+      <p:grpSpPr>
+        <a:xfrm>
+          <a:off x="0" y="0"/>
+          <a:ext cx="0" cy="0"/>
+          <a:chOff x="0" y="0"/>
+          <a:chExt cx="0" cy="0"/>
+        </a:xfrm>
+      </p:grpSpPr>
+      <p:sp>
+        <p:nvSpPr>
+          <p:cNvPr id="2" name="Titel 1"/>
+          <p:cNvSpPr>
+            <a:spLocks noGrp="1"/>
+          </p:cNvSpPr>
+          <p:nvPr>
+            <p:ph type="title"/>
+          </p:nvPr>
+        </p:nvSpPr>
+        <p:spPr/>
+        <p:txBody>
+          <a:bodyPr/>
+          <a:lstStyle/>
+          <a:p>
+            <a:r>
+              <a:rPr lang="de-DE" dirty="0" smtClean="0"/>
+              <a:t>Secret </a:t>
+            </a:r>
+            <a:r>
+              <a:rPr lang="de-DE" dirty="0" err="1" smtClean="0"/>
+              <a:t>scanning</a:t>
+            </a:r>
+            <a:endParaRPr lang="de-DE" dirty="0"/>
+          </a:p>
+        </p:txBody>
+      </p:sp>
+      <p:sp>
+        <p:nvSpPr>
+          <p:cNvPr id="3" name="Inhaltsplatzhalter 2"/>
+          <p:cNvSpPr>
+            <a:spLocks noGrp="1"/>
+          </p:cNvSpPr>
+          <p:nvPr>
+            <p:ph idx="1"/>
+          </p:nvPr>
+        </p:nvSpPr>
+        <p:spPr>
+          <a:xfrm>
+            <a:off x="1024128" y="3543300"/>
+            <a:ext cx="9720073" cy="4023360"/>
+          </a:xfrm>
+        </p:spPr>
+        <p:txBody>
+          <a:bodyPr/>
+          <a:lstStyle/>
+          <a:p>
+            <a:pPr>
+              <a:buFont typeface="Wingdings" panose="05000000000000000000" pitchFamily="2" charset="2"/>
+              <a:buChar char="v"/>
+            </a:pPr>
+            <a:r>
+              <a:rPr lang="de-DE" dirty="0" smtClean="0"/>
+              <a:t> Secret Scanning überprüft, ob </a:t>
+            </a:r>
+            <a:r>
+              <a:rPr lang="de-DE" dirty="0" err="1" smtClean="0"/>
+              <a:t>Secrets</a:t>
+            </a:r>
+            <a:r>
+              <a:rPr lang="de-DE" dirty="0" smtClean="0"/>
+              <a:t> im Repository liegen.</a:t>
+            </a:r>
+          </a:p>
+          <a:p>
+            <a:pPr>
+              <a:buFont typeface="Wingdings" panose="05000000000000000000" pitchFamily="2" charset="2"/>
+              <a:buChar char="v"/>
+            </a:pPr>
+            <a:r>
+              <a:rPr lang="de-DE" dirty="0"/>
+              <a:t> </a:t>
+            </a:r>
+            <a:r>
+              <a:rPr lang="de-DE" dirty="0" smtClean="0"/>
+              <a:t>Erweiterbare Muster mit </a:t>
+            </a:r>
+            <a:r>
+              <a:rPr lang="de-DE" dirty="0" err="1" smtClean="0"/>
+              <a:t>Github</a:t>
+            </a:r>
+            <a:r>
+              <a:rPr lang="de-DE" dirty="0" smtClean="0"/>
+              <a:t> </a:t>
+            </a:r>
+            <a:r>
+              <a:rPr lang="de-DE" dirty="0" err="1" smtClean="0"/>
+              <a:t>Advanced</a:t>
+            </a:r>
+            <a:r>
+              <a:rPr lang="de-DE" dirty="0" smtClean="0"/>
+              <a:t> Security</a:t>
+            </a:r>
+            <a:endParaRPr lang="de-DE" dirty="0"/>
+          </a:p>
+        </p:txBody>
+      </p:sp>
+      <p:sp>
+        <p:nvSpPr>
+          <p:cNvPr id="4" name="Abgerundetes Rechteck 3"/>
+          <p:cNvSpPr/>
+          <p:nvPr/>
+        </p:nvSpPr>
+        <p:spPr>
+          <a:xfrm>
+            <a:off x="3113474" y="1983192"/>
+            <a:ext cx="1732085" cy="923193"/>
+          </a:xfrm>
+          <a:prstGeom prst="roundRect">
+            <a:avLst/>
+          </a:prstGeom>
+        </p:spPr>
+        <p:style>
+          <a:lnRef idx="2">
+            <a:schemeClr val="accent1">
+              <a:shade val="50000"/>
+            </a:schemeClr>
+          </a:lnRef>
+          <a:fillRef idx="1">
+            <a:schemeClr val="accent1"/>
+          </a:fillRef>
+          <a:effectRef idx="0">
+            <a:schemeClr val="accent1"/>
+          </a:effectRef>
+          <a:fontRef idx="minor">
+            <a:schemeClr val="lt1"/>
+          </a:fontRef>
+        </p:style>
+        <p:txBody>
+          <a:bodyPr rtlCol="0" anchor="ctr"/>
+          <a:lstStyle/>
+          <a:p>
+            <a:pPr algn="ctr"/>
+            <a:r>
+              <a:rPr lang="de-DE" dirty="0" err="1" smtClean="0"/>
+              <a:t>Secrets</a:t>
+            </a:r>
+            <a:r>
+              <a:rPr lang="de-DE" dirty="0" smtClean="0"/>
+              <a:t> sollen geheim bleiben</a:t>
+            </a:r>
+            <a:endParaRPr lang="de-DE" dirty="0"/>
+          </a:p>
+        </p:txBody>
+      </p:sp>
+      <p:sp>
+        <p:nvSpPr>
+          <p:cNvPr id="5" name="Pfeil nach rechts 4"/>
+          <p:cNvSpPr/>
+          <p:nvPr/>
+        </p:nvSpPr>
+        <p:spPr>
+          <a:xfrm>
+            <a:off x="5400587" y="2249862"/>
+            <a:ext cx="967154" cy="402512"/>
+          </a:xfrm>
+          <a:prstGeom prst="rightArrow">
+            <a:avLst/>
+          </a:prstGeom>
+        </p:spPr>
+        <p:style>
+          <a:lnRef idx="2">
+            <a:schemeClr val="accent1">
+              <a:shade val="50000"/>
+            </a:schemeClr>
+          </a:lnRef>
+          <a:fillRef idx="1">
+            <a:schemeClr val="accent1"/>
+          </a:fillRef>
+          <a:effectRef idx="0">
+            <a:schemeClr val="accent1"/>
+          </a:effectRef>
+          <a:fontRef idx="minor">
+            <a:schemeClr val="lt1"/>
+          </a:fontRef>
+        </p:style>
+        <p:txBody>
+          <a:bodyPr rtlCol="0" anchor="ctr"/>
+          <a:lstStyle/>
+          <a:p>
+            <a:pPr algn="ctr"/>
+            <a:endParaRPr lang="de-DE"/>
+          </a:p>
+        </p:txBody>
+      </p:sp>
+      <p:sp>
+        <p:nvSpPr>
+          <p:cNvPr id="7" name="Abgerundetes Rechteck 6"/>
+          <p:cNvSpPr/>
+          <p:nvPr/>
+        </p:nvSpPr>
+        <p:spPr>
+          <a:xfrm>
+            <a:off x="6922769" y="1983191"/>
+            <a:ext cx="1732085" cy="923193"/>
+          </a:xfrm>
+          <a:prstGeom prst="roundRect">
+            <a:avLst/>
+          </a:prstGeom>
+        </p:spPr>
+        <p:style>
+          <a:lnRef idx="2">
+            <a:schemeClr val="accent1">
+              <a:shade val="50000"/>
+            </a:schemeClr>
+          </a:lnRef>
+          <a:fillRef idx="1">
+            <a:schemeClr val="accent1"/>
+          </a:fillRef>
+          <a:effectRef idx="0">
+            <a:schemeClr val="accent1"/>
+          </a:effectRef>
+          <a:fontRef idx="minor">
+            <a:schemeClr val="lt1"/>
+          </a:fontRef>
+        </p:style>
+        <p:txBody>
+          <a:bodyPr rtlCol="0" anchor="ctr"/>
+          <a:lstStyle/>
+          <a:p>
+            <a:pPr algn="ctr"/>
+            <a:r>
+              <a:rPr lang="de-DE" dirty="0" err="1" smtClean="0"/>
+              <a:t>Secrets</a:t>
+            </a:r>
+            <a:r>
+              <a:rPr lang="de-DE" dirty="0" smtClean="0"/>
+              <a:t> nicht in </a:t>
+            </a:r>
+            <a:r>
+              <a:rPr lang="de-DE" dirty="0" err="1" smtClean="0"/>
+              <a:t>Repositories</a:t>
+            </a:r>
+            <a:endParaRPr lang="de-DE" dirty="0"/>
+          </a:p>
+        </p:txBody>
+      </p:sp>
+    </p:spTree>
+    <p:extLst>
+      <p:ext uri="{BB962C8B-B14F-4D97-AF65-F5344CB8AC3E}">
+        <p14:creationId xmlns:p14="http://schemas.microsoft.com/office/powerpoint/2010/main" val="2958358037"/>
+      </p:ext>
+    </p:extLst>
+  </p:cSld>
+  <p:clrMapOvr>
+    <a:masterClrMapping/>
+  </p:clrMapOvr>
+  <p:timing>
+    <p:tnLst>
+      <p:par>
+        <p:cTn id="1" dur="indefinite" restart="never" nodeType="tmRoot"/>
+      </p:par>
+    </p:tnLst>
+  </p:timing>
+</p:sld>
+</file>
+
+<file path=ppt/slides/slide13.xml><?xml version="1.0" encoding="utf-8"?>
 <p:sld xmlns:a="http://schemas.openxmlformats.org/drawingml/2006/main" xmlns:r="http://schemas.openxmlformats.org/officeDocument/2006/relationships" xmlns:p="http://schemas.openxmlformats.org/presentationml/2006/main">
   <p:cSld>
     <p:spTree>
@@ -21566,10 +22093,17 @@
   <p:clrMapOvr>
     <a:masterClrMapping/>
   </p:clrMapOvr>
+  <p:timing>
+    <p:tnLst>
+      <p:par>
+        <p:cTn id="1" dur="indefinite" restart="never" nodeType="tmRoot"/>
+      </p:par>
+    </p:tnLst>
+  </p:timing>
 </p:sld>
 </file>
 
-<file path=ppt/slides/slide11.xml><?xml version="1.0" encoding="utf-8"?>
+<file path=ppt/slides/slide14.xml><?xml version="1.0" encoding="utf-8"?>
 <p:sld xmlns:a="http://schemas.openxmlformats.org/drawingml/2006/main" xmlns:r="http://schemas.openxmlformats.org/officeDocument/2006/relationships" xmlns:p="http://schemas.openxmlformats.org/presentationml/2006/main">
   <p:cSld>
     <p:spTree>
@@ -21741,10 +22275,17 @@
   <p:clrMapOvr>
     <a:masterClrMapping/>
   </p:clrMapOvr>
+  <p:timing>
+    <p:tnLst>
+      <p:par>
+        <p:cTn id="1" dur="indefinite" restart="never" nodeType="tmRoot"/>
+      </p:par>
+    </p:tnLst>
+  </p:timing>
 </p:sld>
 </file>
 
-<file path=ppt/slides/slide12.xml><?xml version="1.0" encoding="utf-8"?>
+<file path=ppt/slides/slide15.xml><?xml version="1.0" encoding="utf-8"?>
 <p:sld xmlns:a="http://schemas.openxmlformats.org/drawingml/2006/main" xmlns:r="http://schemas.openxmlformats.org/officeDocument/2006/relationships" xmlns:p="http://schemas.openxmlformats.org/presentationml/2006/main">
   <p:cSld>
     <p:spTree>
@@ -21778,156 +22319,6 @@
           <a:p>
             <a:r>
               <a:rPr lang="de-DE" dirty="0" err="1" smtClean="0"/>
-              <a:t>codespaces</a:t>
-            </a:r>
-            <a:endParaRPr lang="de-DE" dirty="0"/>
-          </a:p>
-        </p:txBody>
-      </p:sp>
-      <p:sp>
-        <p:nvSpPr>
-          <p:cNvPr id="3" name="Inhaltsplatzhalter 2"/>
-          <p:cNvSpPr>
-            <a:spLocks noGrp="1"/>
-          </p:cNvSpPr>
-          <p:nvPr>
-            <p:ph idx="1"/>
-          </p:nvPr>
-        </p:nvSpPr>
-        <p:spPr/>
-        <p:txBody>
-          <a:bodyPr/>
-          <a:lstStyle/>
-          <a:p>
-            <a:pPr>
-              <a:buFont typeface="Wingdings" panose="05000000000000000000" pitchFamily="2" charset="2"/>
-              <a:buChar char="v"/>
-            </a:pPr>
-            <a:r>
-              <a:rPr lang="de-DE" dirty="0" smtClean="0"/>
-              <a:t> Softwareentwicklungsumgebung in der Cloud</a:t>
-            </a:r>
-          </a:p>
-          <a:p>
-            <a:pPr>
-              <a:buFont typeface="Wingdings" panose="05000000000000000000" pitchFamily="2" charset="2"/>
-              <a:buChar char="v"/>
-            </a:pPr>
-            <a:r>
-              <a:rPr lang="de-DE" dirty="0"/>
-              <a:t> </a:t>
-            </a:r>
-            <a:r>
-              <a:rPr lang="de-DE" dirty="0" smtClean="0"/>
-              <a:t>Nutzung von Visual Studio Code mit Terminal und Debugger</a:t>
-            </a:r>
-          </a:p>
-          <a:p>
-            <a:pPr>
-              <a:buFont typeface="Wingdings" panose="05000000000000000000" pitchFamily="2" charset="2"/>
-              <a:buChar char="v"/>
-            </a:pPr>
-            <a:r>
-              <a:rPr lang="de-DE" dirty="0"/>
-              <a:t> </a:t>
-            </a:r>
-            <a:r>
-              <a:rPr lang="de-DE" dirty="0" smtClean="0"/>
-              <a:t>Gute Skalierbarkeit und Standardisierung</a:t>
-            </a:r>
-          </a:p>
-          <a:p>
-            <a:pPr>
-              <a:buFont typeface="Wingdings" panose="05000000000000000000" pitchFamily="2" charset="2"/>
-              <a:buChar char="v"/>
-            </a:pPr>
-            <a:r>
-              <a:rPr lang="de-DE" dirty="0" smtClean="0"/>
-              <a:t> Visual Studio Code bietet viele Security Scanning Erweiterungen</a:t>
-            </a:r>
-          </a:p>
-          <a:p>
-            <a:pPr>
-              <a:buFont typeface="Wingdings" panose="05000000000000000000" pitchFamily="2" charset="2"/>
-              <a:buChar char="v"/>
-            </a:pPr>
-            <a:r>
-              <a:rPr lang="de-DE" dirty="0"/>
-              <a:t> </a:t>
-            </a:r>
-            <a:r>
-              <a:rPr lang="de-DE" dirty="0" smtClean="0"/>
-              <a:t>Nachverfolgung durch Security Logs </a:t>
-            </a:r>
-          </a:p>
-          <a:p>
-            <a:pPr>
-              <a:buFont typeface="Wingdings" panose="05000000000000000000" pitchFamily="2" charset="2"/>
-              <a:buChar char="v"/>
-            </a:pPr>
-            <a:r>
-              <a:rPr lang="de-DE" dirty="0"/>
-              <a:t> </a:t>
-            </a:r>
-            <a:r>
-              <a:rPr lang="de-DE" dirty="0" smtClean="0"/>
-              <a:t>Verschlüsseltes Speichern von Umgebungsvariablen/</a:t>
-            </a:r>
-            <a:r>
-              <a:rPr lang="de-DE" dirty="0" err="1" smtClean="0"/>
-              <a:t>Secrets</a:t>
-            </a:r>
-            <a:endParaRPr lang="de-DE" dirty="0"/>
-          </a:p>
-        </p:txBody>
-      </p:sp>
-    </p:spTree>
-    <p:extLst>
-      <p:ext uri="{BB962C8B-B14F-4D97-AF65-F5344CB8AC3E}">
-        <p14:creationId xmlns:p14="http://schemas.microsoft.com/office/powerpoint/2010/main" val="2544807765"/>
-      </p:ext>
-    </p:extLst>
-  </p:cSld>
-  <p:clrMapOvr>
-    <a:masterClrMapping/>
-  </p:clrMapOvr>
-</p:sld>
-</file>
-
-<file path=ppt/slides/slide13.xml><?xml version="1.0" encoding="utf-8"?>
-<p:sld xmlns:a="http://schemas.openxmlformats.org/drawingml/2006/main" xmlns:r="http://schemas.openxmlformats.org/officeDocument/2006/relationships" xmlns:p="http://schemas.openxmlformats.org/presentationml/2006/main">
-  <p:cSld>
-    <p:spTree>
-      <p:nvGrpSpPr>
-        <p:cNvPr id="1" name=""/>
-        <p:cNvGrpSpPr/>
-        <p:nvPr/>
-      </p:nvGrpSpPr>
-      <p:grpSpPr>
-        <a:xfrm>
-          <a:off x="0" y="0"/>
-          <a:ext cx="0" cy="0"/>
-          <a:chOff x="0" y="0"/>
-          <a:chExt cx="0" cy="0"/>
-        </a:xfrm>
-      </p:grpSpPr>
-      <p:sp>
-        <p:nvSpPr>
-          <p:cNvPr id="2" name="Titel 1"/>
-          <p:cNvSpPr>
-            <a:spLocks noGrp="1"/>
-          </p:cNvSpPr>
-          <p:nvPr>
-            <p:ph type="title"/>
-          </p:nvPr>
-        </p:nvSpPr>
-        <p:spPr/>
-        <p:txBody>
-          <a:bodyPr/>
-          <a:lstStyle/>
-          <a:p>
-            <a:r>
-              <a:rPr lang="de-DE" dirty="0" err="1" smtClean="0"/>
               <a:t>OWAsp</a:t>
             </a:r>
             <a:r>
@@ -22030,11 +22421,7 @@
             </a:r>
             <a:r>
               <a:rPr lang="de-DE" dirty="0" smtClean="0"/>
-              <a:t> </a:t>
-            </a:r>
-            <a:r>
-              <a:rPr lang="de-DE" dirty="0" smtClean="0"/>
-              <a:t>bietet Dokumentation an um Level 1 umsetzen</a:t>
+              <a:t> bietet Dokumentation an um Level 1 umsetzen</a:t>
             </a:r>
             <a:endParaRPr lang="de-DE" dirty="0"/>
           </a:p>
@@ -22080,10 +22467,17 @@
   <p:clrMapOvr>
     <a:masterClrMapping/>
   </p:clrMapOvr>
+  <p:timing>
+    <p:tnLst>
+      <p:par>
+        <p:cTn id="1" dur="indefinite" restart="never" nodeType="tmRoot"/>
+      </p:par>
+    </p:tnLst>
+  </p:timing>
 </p:sld>
 </file>
 
-<file path=ppt/slides/slide14.xml><?xml version="1.0" encoding="utf-8"?>
+<file path=ppt/slides/slide16.xml><?xml version="1.0" encoding="utf-8"?>
 <p:sld xmlns:a="http://schemas.openxmlformats.org/drawingml/2006/main" xmlns:r="http://schemas.openxmlformats.org/officeDocument/2006/relationships" xmlns:p="http://schemas.openxmlformats.org/presentationml/2006/main">
   <p:cSld>
     <p:spTree>
@@ -22219,372 +22613,13 @@
   <p:clrMapOvr>
     <a:masterClrMapping/>
   </p:clrMapOvr>
-</p:sld>
-</file>
-
-<file path=ppt/slides/slide15.xml><?xml version="1.0" encoding="utf-8"?>
-<p:sld xmlns:a="http://schemas.openxmlformats.org/drawingml/2006/main" xmlns:r="http://schemas.openxmlformats.org/officeDocument/2006/relationships" xmlns:p="http://schemas.openxmlformats.org/presentationml/2006/main">
-  <p:cSld>
-    <p:spTree>
-      <p:nvGrpSpPr>
-        <p:cNvPr id="1" name=""/>
-        <p:cNvGrpSpPr/>
-        <p:nvPr/>
-      </p:nvGrpSpPr>
-      <p:grpSpPr>
-        <a:xfrm>
-          <a:off x="0" y="0"/>
-          <a:ext cx="0" cy="0"/>
-          <a:chOff x="0" y="0"/>
-          <a:chExt cx="0" cy="0"/>
-        </a:xfrm>
-      </p:grpSpPr>
-      <p:sp>
-        <p:nvSpPr>
-          <p:cNvPr id="4" name="Titel 3"/>
-          <p:cNvSpPr>
-            <a:spLocks noGrp="1"/>
-          </p:cNvSpPr>
-          <p:nvPr>
-            <p:ph type="title"/>
-          </p:nvPr>
-        </p:nvSpPr>
-        <p:spPr/>
-        <p:txBody>
-          <a:bodyPr/>
-          <a:lstStyle/>
-          <a:p>
-            <a:r>
-              <a:rPr lang="de-DE" dirty="0" err="1" smtClean="0"/>
-              <a:t>Azure</a:t>
-            </a:r>
-            <a:r>
-              <a:rPr lang="de-DE" dirty="0" smtClean="0"/>
-              <a:t> </a:t>
-            </a:r>
-            <a:r>
-              <a:rPr lang="de-DE" dirty="0" err="1" smtClean="0"/>
-              <a:t>Devops</a:t>
-            </a:r>
-            <a:endParaRPr lang="de-DE" dirty="0"/>
-          </a:p>
-        </p:txBody>
-      </p:sp>
-      <p:sp>
-        <p:nvSpPr>
-          <p:cNvPr id="5" name="Textplatzhalter 4"/>
-          <p:cNvSpPr>
-            <a:spLocks noGrp="1"/>
-          </p:cNvSpPr>
-          <p:nvPr>
-            <p:ph type="body" idx="1"/>
-          </p:nvPr>
-        </p:nvSpPr>
-        <p:spPr/>
-        <p:txBody>
-          <a:bodyPr/>
-          <a:lstStyle/>
-          <a:p>
-            <a:r>
-              <a:rPr lang="de-DE" dirty="0" smtClean="0"/>
-              <a:t>mit </a:t>
-            </a:r>
-            <a:r>
-              <a:rPr lang="de-DE" dirty="0" err="1" smtClean="0"/>
-              <a:t>Azure</a:t>
-            </a:r>
-            <a:r>
-              <a:rPr lang="de-DE" dirty="0" smtClean="0"/>
-              <a:t> Pipelines</a:t>
-            </a:r>
-            <a:endParaRPr lang="de-DE" dirty="0"/>
-          </a:p>
-        </p:txBody>
-      </p:sp>
-    </p:spTree>
-    <p:extLst>
-      <p:ext uri="{BB962C8B-B14F-4D97-AF65-F5344CB8AC3E}">
-        <p14:creationId xmlns:p14="http://schemas.microsoft.com/office/powerpoint/2010/main" val="2055349257"/>
-      </p:ext>
-    </p:extLst>
-  </p:cSld>
-  <p:clrMapOvr>
-    <a:masterClrMapping/>
-  </p:clrMapOvr>
-</p:sld>
-</file>
-
-<file path=ppt/slides/slide16.xml><?xml version="1.0" encoding="utf-8"?>
-<p:sld xmlns:a="http://schemas.openxmlformats.org/drawingml/2006/main" xmlns:r="http://schemas.openxmlformats.org/officeDocument/2006/relationships" xmlns:p="http://schemas.openxmlformats.org/presentationml/2006/main">
-  <p:cSld>
-    <p:spTree>
-      <p:nvGrpSpPr>
-        <p:cNvPr id="1" name=""/>
-        <p:cNvGrpSpPr/>
-        <p:nvPr/>
-      </p:nvGrpSpPr>
-      <p:grpSpPr>
-        <a:xfrm>
-          <a:off x="0" y="0"/>
-          <a:ext cx="0" cy="0"/>
-          <a:chOff x="0" y="0"/>
-          <a:chExt cx="0" cy="0"/>
-        </a:xfrm>
-      </p:grpSpPr>
-      <p:sp>
-        <p:nvSpPr>
-          <p:cNvPr id="2" name="Titel 1"/>
-          <p:cNvSpPr>
-            <a:spLocks noGrp="1"/>
-          </p:cNvSpPr>
-          <p:nvPr>
-            <p:ph type="title"/>
-          </p:nvPr>
-        </p:nvSpPr>
-        <p:spPr/>
-        <p:txBody>
-          <a:bodyPr/>
-          <a:lstStyle/>
-          <a:p>
-            <a:r>
-              <a:rPr lang="de-DE" dirty="0" smtClean="0"/>
-              <a:t>Microsoft </a:t>
-            </a:r>
-            <a:r>
-              <a:rPr lang="de-DE" dirty="0"/>
-              <a:t>Security Code Analysis</a:t>
-            </a:r>
-          </a:p>
-        </p:txBody>
-      </p:sp>
-      <p:sp>
-        <p:nvSpPr>
-          <p:cNvPr id="3" name="Inhaltsplatzhalter 2"/>
-          <p:cNvSpPr>
-            <a:spLocks noGrp="1"/>
-          </p:cNvSpPr>
-          <p:nvPr>
-            <p:ph idx="1"/>
-          </p:nvPr>
-        </p:nvSpPr>
-        <p:spPr/>
-        <p:txBody>
-          <a:bodyPr/>
-          <a:lstStyle/>
-          <a:p>
-            <a:pPr>
-              <a:buFont typeface="Wingdings" panose="05000000000000000000" pitchFamily="2" charset="2"/>
-              <a:buChar char="v"/>
-            </a:pPr>
-            <a:r>
-              <a:rPr lang="de-DE" dirty="0" smtClean="0"/>
-              <a:t> </a:t>
-            </a:r>
-            <a:r>
-              <a:rPr lang="de-DE" dirty="0" err="1" smtClean="0"/>
-              <a:t>Azure</a:t>
-            </a:r>
-            <a:r>
-              <a:rPr lang="de-DE" dirty="0" smtClean="0"/>
-              <a:t> </a:t>
-            </a:r>
-            <a:r>
-              <a:rPr lang="de-DE" dirty="0" err="1"/>
-              <a:t>DevOps</a:t>
-            </a:r>
-            <a:r>
-              <a:rPr lang="de-DE" dirty="0"/>
-              <a:t> </a:t>
-            </a:r>
-            <a:r>
-              <a:rPr lang="de-DE" dirty="0" smtClean="0"/>
-              <a:t>Erweiterung</a:t>
-            </a:r>
-          </a:p>
-          <a:p>
-            <a:pPr>
-              <a:buFont typeface="Wingdings" panose="05000000000000000000" pitchFamily="2" charset="2"/>
-              <a:buChar char="v"/>
-            </a:pPr>
-            <a:r>
-              <a:rPr lang="de-DE" dirty="0"/>
-              <a:t> </a:t>
-            </a:r>
-            <a:r>
-              <a:rPr lang="de-DE" dirty="0" smtClean="0"/>
-              <a:t>Zur Einbindung von </a:t>
-            </a:r>
-            <a:r>
-              <a:rPr lang="de-DE" dirty="0" err="1" smtClean="0"/>
-              <a:t>Secuity</a:t>
-            </a:r>
-            <a:r>
-              <a:rPr lang="de-DE" dirty="0" smtClean="0"/>
-              <a:t> Tasks</a:t>
-            </a:r>
-          </a:p>
-          <a:p>
-            <a:pPr lvl="1">
-              <a:buFont typeface="Wingdings" panose="05000000000000000000" pitchFamily="2" charset="2"/>
-              <a:buChar char="v"/>
-            </a:pPr>
-            <a:r>
-              <a:rPr lang="de-DE" dirty="0"/>
-              <a:t> </a:t>
-            </a:r>
-            <a:r>
-              <a:rPr lang="de-DE" dirty="0" err="1" smtClean="0"/>
-              <a:t>Credential</a:t>
-            </a:r>
-            <a:r>
-              <a:rPr lang="de-DE" dirty="0" smtClean="0"/>
-              <a:t> Scanner</a:t>
-            </a:r>
-          </a:p>
-          <a:p>
-            <a:pPr lvl="1">
-              <a:buFont typeface="Wingdings" panose="05000000000000000000" pitchFamily="2" charset="2"/>
-              <a:buChar char="v"/>
-            </a:pPr>
-            <a:r>
-              <a:rPr lang="de-DE" dirty="0" smtClean="0"/>
-              <a:t> </a:t>
-            </a:r>
-            <a:r>
-              <a:rPr lang="de-DE" dirty="0" err="1" smtClean="0"/>
-              <a:t>TSLint</a:t>
-            </a:r>
-            <a:endParaRPr lang="de-DE" dirty="0" smtClean="0"/>
-          </a:p>
-          <a:p>
-            <a:pPr lvl="1">
-              <a:buFont typeface="Wingdings" panose="05000000000000000000" pitchFamily="2" charset="2"/>
-              <a:buChar char="v"/>
-            </a:pPr>
-            <a:r>
-              <a:rPr lang="de-DE" dirty="0" smtClean="0"/>
-              <a:t> </a:t>
-            </a:r>
-            <a:r>
-              <a:rPr lang="de-DE" dirty="0" err="1" smtClean="0"/>
-              <a:t>Roslyn</a:t>
-            </a:r>
-            <a:r>
-              <a:rPr lang="de-DE" dirty="0" smtClean="0"/>
-              <a:t> </a:t>
-            </a:r>
-            <a:r>
-              <a:rPr lang="de-DE" dirty="0" err="1" smtClean="0"/>
-              <a:t>Analyzers</a:t>
-            </a:r>
-            <a:endParaRPr lang="de-DE" dirty="0" smtClean="0"/>
-          </a:p>
-          <a:p>
-            <a:pPr lvl="1">
-              <a:buFont typeface="Wingdings" panose="05000000000000000000" pitchFamily="2" charset="2"/>
-              <a:buChar char="v"/>
-            </a:pPr>
-            <a:r>
-              <a:rPr lang="de-DE" dirty="0" smtClean="0"/>
-              <a:t> </a:t>
-            </a:r>
-            <a:r>
-              <a:rPr lang="de-DE" dirty="0" err="1"/>
-              <a:t>BinSkim</a:t>
-            </a:r>
-            <a:r>
-              <a:rPr lang="de-DE" dirty="0"/>
-              <a:t> </a:t>
-            </a:r>
-            <a:endParaRPr lang="de-DE" dirty="0" smtClean="0"/>
-          </a:p>
-          <a:p>
-            <a:pPr lvl="1">
-              <a:buFont typeface="Wingdings" panose="05000000000000000000" pitchFamily="2" charset="2"/>
-              <a:buChar char="v"/>
-            </a:pPr>
-            <a:r>
-              <a:rPr lang="de-DE" dirty="0"/>
-              <a:t> </a:t>
-            </a:r>
-            <a:r>
-              <a:rPr lang="de-DE" dirty="0" smtClean="0"/>
-              <a:t>Anti-Malware </a:t>
-            </a:r>
-            <a:r>
-              <a:rPr lang="de-DE" dirty="0"/>
-              <a:t>Scanner</a:t>
-            </a:r>
-            <a:r>
-              <a:rPr lang="de-DE" dirty="0" smtClean="0"/>
-              <a:t>.</a:t>
-            </a:r>
-          </a:p>
-          <a:p>
-            <a:pPr>
-              <a:buFont typeface="Wingdings" panose="05000000000000000000" pitchFamily="2" charset="2"/>
-              <a:buChar char="v"/>
-            </a:pPr>
-            <a:r>
-              <a:rPr lang="de-DE" dirty="0"/>
-              <a:t> </a:t>
-            </a:r>
-            <a:r>
-              <a:rPr lang="de-DE" dirty="0" smtClean="0"/>
-              <a:t>Security Report: Zusammenfassung aller Tasks</a:t>
-            </a:r>
-          </a:p>
-          <a:p>
-            <a:pPr>
-              <a:buFont typeface="Wingdings" panose="05000000000000000000" pitchFamily="2" charset="2"/>
-              <a:buChar char="v"/>
-            </a:pPr>
-            <a:r>
-              <a:rPr lang="de-DE" dirty="0" smtClean="0"/>
-              <a:t> </a:t>
-            </a:r>
-            <a:r>
-              <a:rPr lang="de-DE" dirty="0" err="1" smtClean="0"/>
-              <a:t>Logging</a:t>
-            </a:r>
-            <a:r>
-              <a:rPr lang="de-DE" dirty="0" smtClean="0"/>
-              <a:t> der Ergebnisse</a:t>
-            </a:r>
-          </a:p>
-          <a:p>
-            <a:pPr>
-              <a:buFont typeface="Wingdings" panose="05000000000000000000" pitchFamily="2" charset="2"/>
-              <a:buChar char="v"/>
-            </a:pPr>
-            <a:r>
-              <a:rPr lang="de-DE" dirty="0"/>
-              <a:t> </a:t>
-            </a:r>
-            <a:r>
-              <a:rPr lang="de-DE" dirty="0" smtClean="0"/>
-              <a:t>bis Dezember 2022 verfügbar</a:t>
-            </a:r>
-          </a:p>
-          <a:p>
-            <a:pPr>
-              <a:buFont typeface="Wingdings" panose="05000000000000000000" pitchFamily="2" charset="2"/>
-              <a:buChar char="v"/>
-            </a:pPr>
-            <a:endParaRPr lang="de-DE" dirty="0"/>
-          </a:p>
-        </p:txBody>
-      </p:sp>
-    </p:spTree>
-    <p:extLst>
-      <p:ext uri="{BB962C8B-B14F-4D97-AF65-F5344CB8AC3E}">
-        <p14:creationId xmlns:p14="http://schemas.microsoft.com/office/powerpoint/2010/main" val="3124521187"/>
-      </p:ext>
-    </p:extLst>
-  </p:cSld>
-  <p:clrMapOvr>
-    <a:masterClrMapping/>
-  </p:clrMapOvr>
+  <p:timing>
+    <p:tnLst>
+      <p:par>
+        <p:cTn id="1" dur="indefinite" restart="never" nodeType="tmRoot"/>
+      </p:par>
+    </p:tnLst>
+  </p:timing>
 </p:sld>
 </file>
 
@@ -22621,8 +22656,16 @@
           <a:lstStyle/>
           <a:p>
             <a:r>
+              <a:rPr lang="de-DE" dirty="0" err="1" smtClean="0"/>
+              <a:t>Azure</a:t>
+            </a:r>
+            <a:r>
               <a:rPr lang="de-DE" dirty="0" smtClean="0"/>
-              <a:t>Vergleich</a:t>
+              <a:t> </a:t>
+            </a:r>
+            <a:r>
+              <a:rPr lang="de-DE" dirty="0" err="1" smtClean="0"/>
+              <a:t>Devops</a:t>
             </a:r>
             <a:endParaRPr lang="de-DE" dirty="0"/>
           </a:p>
@@ -22643,20 +22686,39 @@
           <a:bodyPr/>
           <a:lstStyle/>
           <a:p>
-            <a:endParaRPr lang="de-DE"/>
+            <a:r>
+              <a:rPr lang="de-DE" dirty="0" smtClean="0"/>
+              <a:t>mit </a:t>
+            </a:r>
+            <a:r>
+              <a:rPr lang="de-DE" dirty="0" err="1" smtClean="0"/>
+              <a:t>Azure</a:t>
+            </a:r>
+            <a:r>
+              <a:rPr lang="de-DE" dirty="0" smtClean="0"/>
+              <a:t> Pipelines</a:t>
+            </a:r>
+            <a:endParaRPr lang="de-DE" dirty="0"/>
           </a:p>
         </p:txBody>
       </p:sp>
     </p:spTree>
     <p:extLst>
       <p:ext uri="{BB962C8B-B14F-4D97-AF65-F5344CB8AC3E}">
-        <p14:creationId xmlns:p14="http://schemas.microsoft.com/office/powerpoint/2010/main" val="1879096459"/>
+        <p14:creationId xmlns:p14="http://schemas.microsoft.com/office/powerpoint/2010/main" val="2055349257"/>
       </p:ext>
     </p:extLst>
   </p:cSld>
   <p:clrMapOvr>
     <a:masterClrMapping/>
   </p:clrMapOvr>
+  <p:timing>
+    <p:tnLst>
+      <p:par>
+        <p:cTn id="1" dur="indefinite" restart="never" nodeType="tmRoot"/>
+      </p:par>
+    </p:tnLst>
+  </p:timing>
 </p:sld>
 </file>
 
@@ -22694,6 +22756,624 @@
           <a:p>
             <a:r>
               <a:rPr lang="de-DE" dirty="0" smtClean="0"/>
+              <a:t>Microsoft </a:t>
+            </a:r>
+            <a:r>
+              <a:rPr lang="de-DE" dirty="0"/>
+              <a:t>Security Code Analysis</a:t>
+            </a:r>
+          </a:p>
+        </p:txBody>
+      </p:sp>
+      <p:sp>
+        <p:nvSpPr>
+          <p:cNvPr id="3" name="Inhaltsplatzhalter 2"/>
+          <p:cNvSpPr>
+            <a:spLocks noGrp="1"/>
+          </p:cNvSpPr>
+          <p:nvPr>
+            <p:ph idx="1"/>
+          </p:nvPr>
+        </p:nvSpPr>
+        <p:spPr/>
+        <p:txBody>
+          <a:bodyPr/>
+          <a:lstStyle/>
+          <a:p>
+            <a:pPr>
+              <a:buFont typeface="Wingdings" panose="05000000000000000000" pitchFamily="2" charset="2"/>
+              <a:buChar char="v"/>
+            </a:pPr>
+            <a:r>
+              <a:rPr lang="de-DE" dirty="0" smtClean="0"/>
+              <a:t> </a:t>
+            </a:r>
+            <a:r>
+              <a:rPr lang="de-DE" dirty="0" err="1" smtClean="0"/>
+              <a:t>Azure</a:t>
+            </a:r>
+            <a:r>
+              <a:rPr lang="de-DE" dirty="0" smtClean="0"/>
+              <a:t> </a:t>
+            </a:r>
+            <a:r>
+              <a:rPr lang="de-DE" dirty="0" err="1"/>
+              <a:t>DevOps</a:t>
+            </a:r>
+            <a:r>
+              <a:rPr lang="de-DE" dirty="0"/>
+              <a:t> </a:t>
+            </a:r>
+            <a:r>
+              <a:rPr lang="de-DE" dirty="0" smtClean="0"/>
+              <a:t>Erweiterung</a:t>
+            </a:r>
+          </a:p>
+          <a:p>
+            <a:pPr>
+              <a:buFont typeface="Wingdings" panose="05000000000000000000" pitchFamily="2" charset="2"/>
+              <a:buChar char="v"/>
+            </a:pPr>
+            <a:r>
+              <a:rPr lang="de-DE" dirty="0"/>
+              <a:t> </a:t>
+            </a:r>
+            <a:r>
+              <a:rPr lang="de-DE" dirty="0" smtClean="0"/>
+              <a:t>Zur Einbindung von </a:t>
+            </a:r>
+            <a:r>
+              <a:rPr lang="de-DE" dirty="0" smtClean="0"/>
+              <a:t>Security </a:t>
+            </a:r>
+            <a:r>
+              <a:rPr lang="de-DE" dirty="0" smtClean="0"/>
+              <a:t>Tasks</a:t>
+            </a:r>
+          </a:p>
+          <a:p>
+            <a:pPr lvl="1">
+              <a:buFont typeface="Wingdings" panose="05000000000000000000" pitchFamily="2" charset="2"/>
+              <a:buChar char="v"/>
+            </a:pPr>
+            <a:r>
+              <a:rPr lang="de-DE" dirty="0"/>
+              <a:t> </a:t>
+            </a:r>
+            <a:r>
+              <a:rPr lang="de-DE" dirty="0" err="1" smtClean="0"/>
+              <a:t>Credential</a:t>
+            </a:r>
+            <a:r>
+              <a:rPr lang="de-DE" dirty="0" smtClean="0"/>
+              <a:t> Scanner</a:t>
+            </a:r>
+          </a:p>
+          <a:p>
+            <a:pPr lvl="1">
+              <a:buFont typeface="Wingdings" panose="05000000000000000000" pitchFamily="2" charset="2"/>
+              <a:buChar char="v"/>
+            </a:pPr>
+            <a:r>
+              <a:rPr lang="de-DE" dirty="0" smtClean="0"/>
+              <a:t> </a:t>
+            </a:r>
+            <a:r>
+              <a:rPr lang="de-DE" dirty="0" err="1" smtClean="0"/>
+              <a:t>TSLint</a:t>
+            </a:r>
+            <a:endParaRPr lang="de-DE" dirty="0" smtClean="0"/>
+          </a:p>
+          <a:p>
+            <a:pPr lvl="1">
+              <a:buFont typeface="Wingdings" panose="05000000000000000000" pitchFamily="2" charset="2"/>
+              <a:buChar char="v"/>
+            </a:pPr>
+            <a:r>
+              <a:rPr lang="de-DE" dirty="0" smtClean="0"/>
+              <a:t> </a:t>
+            </a:r>
+            <a:r>
+              <a:rPr lang="de-DE" dirty="0" err="1" smtClean="0"/>
+              <a:t>Roslyn</a:t>
+            </a:r>
+            <a:r>
+              <a:rPr lang="de-DE" dirty="0" smtClean="0"/>
+              <a:t> </a:t>
+            </a:r>
+            <a:r>
+              <a:rPr lang="de-DE" dirty="0" err="1" smtClean="0"/>
+              <a:t>Analyzers</a:t>
+            </a:r>
+            <a:endParaRPr lang="de-DE" dirty="0" smtClean="0"/>
+          </a:p>
+          <a:p>
+            <a:pPr lvl="1">
+              <a:buFont typeface="Wingdings" panose="05000000000000000000" pitchFamily="2" charset="2"/>
+              <a:buChar char="v"/>
+            </a:pPr>
+            <a:r>
+              <a:rPr lang="de-DE" dirty="0" smtClean="0"/>
+              <a:t> </a:t>
+            </a:r>
+            <a:r>
+              <a:rPr lang="de-DE" dirty="0" err="1"/>
+              <a:t>BinSkim</a:t>
+            </a:r>
+            <a:r>
+              <a:rPr lang="de-DE" dirty="0"/>
+              <a:t> </a:t>
+            </a:r>
+            <a:endParaRPr lang="de-DE" dirty="0" smtClean="0"/>
+          </a:p>
+          <a:p>
+            <a:pPr lvl="1">
+              <a:buFont typeface="Wingdings" panose="05000000000000000000" pitchFamily="2" charset="2"/>
+              <a:buChar char="v"/>
+            </a:pPr>
+            <a:r>
+              <a:rPr lang="de-DE" dirty="0"/>
+              <a:t> </a:t>
+            </a:r>
+            <a:r>
+              <a:rPr lang="de-DE" dirty="0" smtClean="0"/>
+              <a:t>Anti-Malware </a:t>
+            </a:r>
+            <a:r>
+              <a:rPr lang="de-DE" dirty="0"/>
+              <a:t>Scanner</a:t>
+            </a:r>
+            <a:r>
+              <a:rPr lang="de-DE" dirty="0" smtClean="0"/>
+              <a:t>.</a:t>
+            </a:r>
+          </a:p>
+          <a:p>
+            <a:pPr>
+              <a:buFont typeface="Wingdings" panose="05000000000000000000" pitchFamily="2" charset="2"/>
+              <a:buChar char="v"/>
+            </a:pPr>
+            <a:r>
+              <a:rPr lang="de-DE" dirty="0"/>
+              <a:t> </a:t>
+            </a:r>
+            <a:r>
+              <a:rPr lang="de-DE" dirty="0" smtClean="0"/>
+              <a:t>Security Report: Zusammenfassung aller Tasks</a:t>
+            </a:r>
+          </a:p>
+          <a:p>
+            <a:pPr>
+              <a:buFont typeface="Wingdings" panose="05000000000000000000" pitchFamily="2" charset="2"/>
+              <a:buChar char="v"/>
+            </a:pPr>
+            <a:r>
+              <a:rPr lang="de-DE" dirty="0" smtClean="0"/>
+              <a:t> </a:t>
+            </a:r>
+            <a:r>
+              <a:rPr lang="de-DE" dirty="0" err="1" smtClean="0"/>
+              <a:t>Logging</a:t>
+            </a:r>
+            <a:r>
+              <a:rPr lang="de-DE" dirty="0" smtClean="0"/>
+              <a:t> der Ergebnisse</a:t>
+            </a:r>
+          </a:p>
+          <a:p>
+            <a:pPr>
+              <a:buFont typeface="Wingdings" panose="05000000000000000000" pitchFamily="2" charset="2"/>
+              <a:buChar char="v"/>
+            </a:pPr>
+            <a:r>
+              <a:rPr lang="de-DE" dirty="0"/>
+              <a:t> </a:t>
+            </a:r>
+            <a:r>
+              <a:rPr lang="de-DE" dirty="0" smtClean="0"/>
+              <a:t>bis Dezember 2022 verfügbar</a:t>
+            </a:r>
+          </a:p>
+          <a:p>
+            <a:pPr>
+              <a:buFont typeface="Wingdings" panose="05000000000000000000" pitchFamily="2" charset="2"/>
+              <a:buChar char="v"/>
+            </a:pPr>
+            <a:endParaRPr lang="de-DE" dirty="0"/>
+          </a:p>
+        </p:txBody>
+      </p:sp>
+    </p:spTree>
+    <p:extLst>
+      <p:ext uri="{BB962C8B-B14F-4D97-AF65-F5344CB8AC3E}">
+        <p14:creationId xmlns:p14="http://schemas.microsoft.com/office/powerpoint/2010/main" val="3124521187"/>
+      </p:ext>
+    </p:extLst>
+  </p:cSld>
+  <p:clrMapOvr>
+    <a:masterClrMapping/>
+  </p:clrMapOvr>
+  <p:timing>
+    <p:tnLst>
+      <p:par>
+        <p:cTn id="1" dur="indefinite" restart="never" nodeType="tmRoot"/>
+      </p:par>
+    </p:tnLst>
+  </p:timing>
+</p:sld>
+</file>
+
+<file path=ppt/slides/slide19.xml><?xml version="1.0" encoding="utf-8"?>
+<p:sld xmlns:a="http://schemas.openxmlformats.org/drawingml/2006/main" xmlns:r="http://schemas.openxmlformats.org/officeDocument/2006/relationships" xmlns:p="http://schemas.openxmlformats.org/presentationml/2006/main">
+  <p:cSld>
+    <p:spTree>
+      <p:nvGrpSpPr>
+        <p:cNvPr id="1" name=""/>
+        <p:cNvGrpSpPr/>
+        <p:nvPr/>
+      </p:nvGrpSpPr>
+      <p:grpSpPr>
+        <a:xfrm>
+          <a:off x="0" y="0"/>
+          <a:ext cx="0" cy="0"/>
+          <a:chOff x="0" y="0"/>
+          <a:chExt cx="0" cy="0"/>
+        </a:xfrm>
+      </p:grpSpPr>
+      <p:sp>
+        <p:nvSpPr>
+          <p:cNvPr id="4" name="Titel 3"/>
+          <p:cNvSpPr>
+            <a:spLocks noGrp="1"/>
+          </p:cNvSpPr>
+          <p:nvPr>
+            <p:ph type="title"/>
+          </p:nvPr>
+        </p:nvSpPr>
+        <p:spPr/>
+        <p:txBody>
+          <a:bodyPr/>
+          <a:lstStyle/>
+          <a:p>
+            <a:r>
+              <a:rPr lang="de-DE" dirty="0" smtClean="0"/>
+              <a:t>Vergleich</a:t>
+            </a:r>
+            <a:endParaRPr lang="de-DE" dirty="0"/>
+          </a:p>
+        </p:txBody>
+      </p:sp>
+      <p:sp>
+        <p:nvSpPr>
+          <p:cNvPr id="5" name="Textplatzhalter 4"/>
+          <p:cNvSpPr>
+            <a:spLocks noGrp="1"/>
+          </p:cNvSpPr>
+          <p:nvPr>
+            <p:ph type="body" idx="1"/>
+          </p:nvPr>
+        </p:nvSpPr>
+        <p:spPr/>
+        <p:txBody>
+          <a:bodyPr/>
+          <a:lstStyle/>
+          <a:p>
+            <a:endParaRPr lang="de-DE"/>
+          </a:p>
+        </p:txBody>
+      </p:sp>
+    </p:spTree>
+    <p:extLst>
+      <p:ext uri="{BB962C8B-B14F-4D97-AF65-F5344CB8AC3E}">
+        <p14:creationId xmlns:p14="http://schemas.microsoft.com/office/powerpoint/2010/main" val="1879096459"/>
+      </p:ext>
+    </p:extLst>
+  </p:cSld>
+  <p:clrMapOvr>
+    <a:masterClrMapping/>
+  </p:clrMapOvr>
+  <p:timing>
+    <p:tnLst>
+      <p:par>
+        <p:cTn id="1" dur="indefinite" restart="never" nodeType="tmRoot"/>
+      </p:par>
+    </p:tnLst>
+  </p:timing>
+</p:sld>
+</file>
+
+<file path=ppt/slides/slide2.xml><?xml version="1.0" encoding="utf-8"?>
+<p:sld xmlns:a="http://schemas.openxmlformats.org/drawingml/2006/main" xmlns:r="http://schemas.openxmlformats.org/officeDocument/2006/relationships" xmlns:p="http://schemas.openxmlformats.org/presentationml/2006/main">
+  <p:cSld>
+    <p:spTree>
+      <p:nvGrpSpPr>
+        <p:cNvPr id="1" name=""/>
+        <p:cNvGrpSpPr/>
+        <p:nvPr/>
+      </p:nvGrpSpPr>
+      <p:grpSpPr>
+        <a:xfrm>
+          <a:off x="0" y="0"/>
+          <a:ext cx="0" cy="0"/>
+          <a:chOff x="0" y="0"/>
+          <a:chExt cx="0" cy="0"/>
+        </a:xfrm>
+      </p:grpSpPr>
+      <p:pic>
+        <p:nvPicPr>
+          <p:cNvPr id="6" name="Inhaltsplatzhalter 5"/>
+          <p:cNvPicPr>
+            <a:picLocks noGrp="1" noChangeAspect="1"/>
+          </p:cNvPicPr>
+          <p:nvPr>
+            <p:ph idx="1"/>
+          </p:nvPr>
+        </p:nvPicPr>
+        <p:blipFill>
+          <a:blip r:embed="rId2">
+            <a:extLst>
+              <a:ext uri="{28A0092B-C50C-407E-A947-70E740481C1C}">
+                <a14:useLocalDpi xmlns:a14="http://schemas.microsoft.com/office/drawing/2010/main" val="0"/>
+              </a:ext>
+            </a:extLst>
+          </a:blip>
+          <a:stretch>
+            <a:fillRect/>
+          </a:stretch>
+        </p:blipFill>
+        <p:spPr>
+          <a:xfrm>
+            <a:off x="1602451" y="246184"/>
+            <a:ext cx="8658172" cy="6433023"/>
+          </a:xfrm>
+        </p:spPr>
+      </p:pic>
+      <p:sp>
+        <p:nvSpPr>
+          <p:cNvPr id="7" name="Rechteck 6"/>
+          <p:cNvSpPr/>
+          <p:nvPr/>
+        </p:nvSpPr>
+        <p:spPr>
+          <a:xfrm>
+            <a:off x="386862" y="536331"/>
+            <a:ext cx="800100" cy="1573823"/>
+          </a:xfrm>
+          <a:prstGeom prst="rect">
+            <a:avLst/>
+          </a:prstGeom>
+          <a:solidFill>
+            <a:schemeClr val="bg1"/>
+          </a:solidFill>
+          <a:ln>
+            <a:solidFill>
+              <a:schemeClr val="bg1"/>
+            </a:solidFill>
+          </a:ln>
+        </p:spPr>
+        <p:style>
+          <a:lnRef idx="2">
+            <a:schemeClr val="accent1">
+              <a:shade val="50000"/>
+            </a:schemeClr>
+          </a:lnRef>
+          <a:fillRef idx="1">
+            <a:schemeClr val="accent1"/>
+          </a:fillRef>
+          <a:effectRef idx="0">
+            <a:schemeClr val="accent1"/>
+          </a:effectRef>
+          <a:fontRef idx="minor">
+            <a:schemeClr val="lt1"/>
+          </a:fontRef>
+        </p:style>
+        <p:txBody>
+          <a:bodyPr rtlCol="0" anchor="ctr"/>
+          <a:lstStyle/>
+          <a:p>
+            <a:pPr algn="ctr"/>
+            <a:endParaRPr lang="de-DE"/>
+          </a:p>
+        </p:txBody>
+      </p:sp>
+    </p:spTree>
+    <p:extLst>
+      <p:ext uri="{BB962C8B-B14F-4D97-AF65-F5344CB8AC3E}">
+        <p14:creationId xmlns:p14="http://schemas.microsoft.com/office/powerpoint/2010/main" val="2529457683"/>
+      </p:ext>
+    </p:extLst>
+  </p:cSld>
+  <p:clrMapOvr>
+    <a:masterClrMapping/>
+  </p:clrMapOvr>
+  <p:timing>
+    <p:tnLst>
+      <p:par>
+        <p:cTn id="1" dur="indefinite" restart="never" nodeType="tmRoot"/>
+      </p:par>
+    </p:tnLst>
+  </p:timing>
+</p:sld>
+</file>
+
+<file path=ppt/slides/slide20.xml><?xml version="1.0" encoding="utf-8"?>
+<p:sld xmlns:a="http://schemas.openxmlformats.org/drawingml/2006/main" xmlns:r="http://schemas.openxmlformats.org/officeDocument/2006/relationships" xmlns:p="http://schemas.openxmlformats.org/presentationml/2006/main">
+  <p:cSld>
+    <p:spTree>
+      <p:nvGrpSpPr>
+        <p:cNvPr id="1" name=""/>
+        <p:cNvGrpSpPr/>
+        <p:nvPr/>
+      </p:nvGrpSpPr>
+      <p:grpSpPr>
+        <a:xfrm>
+          <a:off x="0" y="0"/>
+          <a:ext cx="0" cy="0"/>
+          <a:chOff x="0" y="0"/>
+          <a:chExt cx="0" cy="0"/>
+        </a:xfrm>
+      </p:grpSpPr>
+      <p:sp>
+        <p:nvSpPr>
+          <p:cNvPr id="9" name="Rechteck 8"/>
+          <p:cNvSpPr/>
+          <p:nvPr/>
+        </p:nvSpPr>
+        <p:spPr>
+          <a:xfrm>
+            <a:off x="386862" y="536331"/>
+            <a:ext cx="800100" cy="1573823"/>
+          </a:xfrm>
+          <a:prstGeom prst="rect">
+            <a:avLst/>
+          </a:prstGeom>
+          <a:solidFill>
+            <a:schemeClr val="bg1"/>
+          </a:solidFill>
+          <a:ln>
+            <a:solidFill>
+              <a:schemeClr val="bg1"/>
+            </a:solidFill>
+          </a:ln>
+        </p:spPr>
+        <p:style>
+          <a:lnRef idx="2">
+            <a:schemeClr val="accent1">
+              <a:shade val="50000"/>
+            </a:schemeClr>
+          </a:lnRef>
+          <a:fillRef idx="1">
+            <a:schemeClr val="accent1"/>
+          </a:fillRef>
+          <a:effectRef idx="0">
+            <a:schemeClr val="accent1"/>
+          </a:effectRef>
+          <a:fontRef idx="minor">
+            <a:schemeClr val="lt1"/>
+          </a:fontRef>
+        </p:style>
+        <p:txBody>
+          <a:bodyPr rtlCol="0" anchor="ctr"/>
+          <a:lstStyle/>
+          <a:p>
+            <a:pPr algn="ctr"/>
+            <a:endParaRPr lang="de-DE"/>
+          </a:p>
+        </p:txBody>
+      </p:sp>
+      <p:pic>
+        <p:nvPicPr>
+          <p:cNvPr id="6" name="Inhaltsplatzhalter 5"/>
+          <p:cNvPicPr>
+            <a:picLocks noGrp="1" noChangeAspect="1"/>
+          </p:cNvPicPr>
+          <p:nvPr>
+            <p:ph idx="1"/>
+          </p:nvPr>
+        </p:nvPicPr>
+        <p:blipFill>
+          <a:blip r:embed="rId2">
+            <a:extLst>
+              <a:ext uri="{28A0092B-C50C-407E-A947-70E740481C1C}">
+                <a14:useLocalDpi xmlns:a14="http://schemas.microsoft.com/office/drawing/2010/main" val="0"/>
+              </a:ext>
+            </a:extLst>
+          </a:blip>
+          <a:stretch>
+            <a:fillRect/>
+          </a:stretch>
+        </p:blipFill>
+        <p:spPr>
+          <a:xfrm>
+            <a:off x="287764" y="1717431"/>
+            <a:ext cx="6286500" cy="3810000"/>
+          </a:xfrm>
+        </p:spPr>
+      </p:pic>
+      <p:pic>
+        <p:nvPicPr>
+          <p:cNvPr id="8" name="Grafik 7"/>
+          <p:cNvPicPr>
+            <a:picLocks noChangeAspect="1"/>
+          </p:cNvPicPr>
+          <p:nvPr/>
+        </p:nvPicPr>
+        <p:blipFill>
+          <a:blip r:embed="rId3">
+            <a:extLst>
+              <a:ext uri="{28A0092B-C50C-407E-A947-70E740481C1C}">
+                <a14:useLocalDpi xmlns:a14="http://schemas.microsoft.com/office/drawing/2010/main" val="0"/>
+              </a:ext>
+            </a:extLst>
+          </a:blip>
+          <a:stretch>
+            <a:fillRect/>
+          </a:stretch>
+        </p:blipFill>
+        <p:spPr>
+          <a:xfrm>
+            <a:off x="6188319" y="1717431"/>
+            <a:ext cx="6286500" cy="3810000"/>
+          </a:xfrm>
+          <a:prstGeom prst="rect">
+            <a:avLst/>
+          </a:prstGeom>
+        </p:spPr>
+      </p:pic>
+    </p:spTree>
+    <p:extLst>
+      <p:ext uri="{BB962C8B-B14F-4D97-AF65-F5344CB8AC3E}">
+        <p14:creationId xmlns:p14="http://schemas.microsoft.com/office/powerpoint/2010/main" val="535145816"/>
+      </p:ext>
+    </p:extLst>
+  </p:cSld>
+  <p:clrMapOvr>
+    <a:masterClrMapping/>
+  </p:clrMapOvr>
+  <p:timing>
+    <p:tnLst>
+      <p:par>
+        <p:cTn id="1" dur="indefinite" restart="never" nodeType="tmRoot"/>
+      </p:par>
+    </p:tnLst>
+  </p:timing>
+</p:sld>
+</file>
+
+<file path=ppt/slides/slide21.xml><?xml version="1.0" encoding="utf-8"?>
+<p:sld xmlns:a="http://schemas.openxmlformats.org/drawingml/2006/main" xmlns:r="http://schemas.openxmlformats.org/officeDocument/2006/relationships" xmlns:p="http://schemas.openxmlformats.org/presentationml/2006/main">
+  <p:cSld>
+    <p:spTree>
+      <p:nvGrpSpPr>
+        <p:cNvPr id="1" name=""/>
+        <p:cNvGrpSpPr/>
+        <p:nvPr/>
+      </p:nvGrpSpPr>
+      <p:grpSpPr>
+        <a:xfrm>
+          <a:off x="0" y="0"/>
+          <a:ext cx="0" cy="0"/>
+          <a:chOff x="0" y="0"/>
+          <a:chExt cx="0" cy="0"/>
+        </a:xfrm>
+      </p:grpSpPr>
+      <p:sp>
+        <p:nvSpPr>
+          <p:cNvPr id="2" name="Titel 1"/>
+          <p:cNvSpPr>
+            <a:spLocks noGrp="1"/>
+          </p:cNvSpPr>
+          <p:nvPr>
+            <p:ph type="title"/>
+          </p:nvPr>
+        </p:nvSpPr>
+        <p:spPr/>
+        <p:txBody>
+          <a:bodyPr/>
+          <a:lstStyle/>
+          <a:p>
+            <a:r>
+              <a:rPr lang="de-DE" dirty="0" smtClean="0"/>
               <a:t>Benutzer Berechtigungen</a:t>
             </a:r>
             <a:endParaRPr lang="de-DE" dirty="0"/>
@@ -22804,15 +23484,15 @@
             </a:pPr>
             <a:r>
               <a:rPr lang="de-DE" dirty="0" smtClean="0"/>
-              <a:t>Organisationen können auch </a:t>
-            </a:r>
-            <a:r>
-              <a:rPr lang="de-DE" dirty="0" err="1" smtClean="0"/>
-              <a:t>gruppenbassiert</a:t>
+              <a:t> Organisationen können auch </a:t>
             </a:r>
             <a:r>
               <a:rPr lang="de-DE" dirty="0" smtClean="0"/>
-              <a:t> eigene Rollen erstellen</a:t>
+              <a:t>gruppenbasiert </a:t>
+            </a:r>
+            <a:r>
+              <a:rPr lang="de-DE" dirty="0" smtClean="0"/>
+              <a:t>eigene Rollen erstellen</a:t>
             </a:r>
           </a:p>
           <a:p>
@@ -22828,23 +23508,15 @@
             </a:pPr>
             <a:r>
               <a:rPr lang="de-DE" dirty="0" smtClean="0"/>
-              <a:t>	Für Firmen gibt es ähnliche </a:t>
+              <a:t>	Für Firmen gibt es ähnliche Möglichkeiten durch </a:t>
             </a:r>
             <a:r>
               <a:rPr lang="de-DE" dirty="0" smtClean="0"/>
-              <a:t>M</a:t>
+              <a:t>das selbe </a:t>
             </a:r>
             <a:r>
               <a:rPr lang="de-DE" dirty="0" smtClean="0"/>
-              <a:t>öglichkeiten durch </a:t>
-            </a:r>
-            <a:r>
-              <a:rPr lang="de-DE" dirty="0" err="1" smtClean="0"/>
-              <a:t>selbes</a:t>
-            </a:r>
-            <a:r>
-              <a:rPr lang="de-DE" dirty="0" smtClean="0"/>
-              <a:t> Konzept</a:t>
+              <a:t>Konzept</a:t>
             </a:r>
           </a:p>
         </p:txBody>
@@ -22899,10 +23571,119 @@
   <p:clrMapOvr>
     <a:masterClrMapping/>
   </p:clrMapOvr>
+  <p:timing>
+    <p:tnLst>
+      <p:par>
+        <p:cTn id="1" dur="indefinite" restart="never" nodeType="tmRoot">
+          <p:childTnLst>
+            <p:seq concurrent="1" nextAc="seek">
+              <p:cTn id="2" dur="indefinite" nodeType="mainSeq">
+                <p:childTnLst>
+                  <p:par>
+                    <p:cTn id="3" fill="hold">
+                      <p:stCondLst>
+                        <p:cond delay="indefinite"/>
+                      </p:stCondLst>
+                      <p:childTnLst>
+                        <p:par>
+                          <p:cTn id="4" fill="hold">
+                            <p:stCondLst>
+                              <p:cond delay="0"/>
+                            </p:stCondLst>
+                            <p:childTnLst>
+                              <p:par>
+                                <p:cTn id="5" presetID="1" presetClass="entr" presetSubtype="0" fill="hold" nodeType="clickEffect">
+                                  <p:stCondLst>
+                                    <p:cond delay="0"/>
+                                  </p:stCondLst>
+                                  <p:childTnLst>
+                                    <p:set>
+                                      <p:cBhvr>
+                                        <p:cTn id="6" dur="1" fill="hold">
+                                          <p:stCondLst>
+                                            <p:cond delay="0"/>
+                                          </p:stCondLst>
+                                        </p:cTn>
+                                        <p:tgtEl>
+                                          <p:spTgt spid="3">
+                                            <p:txEl>
+                                              <p:pRg st="7" end="7"/>
+                                            </p:txEl>
+                                          </p:spTgt>
+                                        </p:tgtEl>
+                                        <p:attrNameLst>
+                                          <p:attrName>style.visibility</p:attrName>
+                                        </p:attrNameLst>
+                                      </p:cBhvr>
+                                      <p:to>
+                                        <p:strVal val="visible"/>
+                                      </p:to>
+                                    </p:set>
+                                  </p:childTnLst>
+                                </p:cTn>
+                              </p:par>
+                              <p:par>
+                                <p:cTn id="7" presetID="1" presetClass="entr" presetSubtype="0" fill="hold" grpId="0" nodeType="withEffect">
+                                  <p:stCondLst>
+                                    <p:cond delay="0"/>
+                                  </p:stCondLst>
+                                  <p:childTnLst>
+                                    <p:set>
+                                      <p:cBhvr>
+                                        <p:cTn id="8" dur="1" fill="hold">
+                                          <p:stCondLst>
+                                            <p:cond delay="0"/>
+                                          </p:stCondLst>
+                                        </p:cTn>
+                                        <p:tgtEl>
+                                          <p:spTgt spid="4"/>
+                                        </p:tgtEl>
+                                        <p:attrNameLst>
+                                          <p:attrName>style.visibility</p:attrName>
+                                        </p:attrNameLst>
+                                      </p:cBhvr>
+                                      <p:to>
+                                        <p:strVal val="visible"/>
+                                      </p:to>
+                                    </p:set>
+                                  </p:childTnLst>
+                                </p:cTn>
+                              </p:par>
+                            </p:childTnLst>
+                          </p:cTn>
+                        </p:par>
+                      </p:childTnLst>
+                    </p:cTn>
+                  </p:par>
+                </p:childTnLst>
+              </p:cTn>
+              <p:prevCondLst>
+                <p:cond evt="onPrev" delay="0">
+                  <p:tgtEl>
+                    <p:sldTgt/>
+                  </p:tgtEl>
+                </p:cond>
+              </p:prevCondLst>
+              <p:nextCondLst>
+                <p:cond evt="onNext" delay="0">
+                  <p:tgtEl>
+                    <p:sldTgt/>
+                  </p:tgtEl>
+                </p:cond>
+              </p:nextCondLst>
+            </p:seq>
+          </p:childTnLst>
+        </p:cTn>
+      </p:par>
+    </p:tnLst>
+    <p:bldLst>
+      <p:bldP spid="4" grpId="0" animBg="1"/>
+    </p:bldLst>
+  </p:timing>
 </p:sld>
 </file>
 
-<file path=ppt/slides/slide19.xml><?xml version="1.0" encoding="utf-8"?>
+<file path=ppt/slides/slide22.xml><?xml version="1.0" encoding="utf-8"?>
 <p:sld xmlns:a="http://schemas.openxmlformats.org/drawingml/2006/main" xmlns:r="http://schemas.openxmlformats.org/officeDocument/2006/relationships" xmlns:p="http://schemas.openxmlformats.org/presentationml/2006/main">
   <p:cSld>
     <p:spTree>
@@ -22984,23 +23765,7 @@
             </a:pPr>
             <a:r>
               <a:rPr lang="de-DE" dirty="0" smtClean="0"/>
-              <a:t> Nutzen von Drittanbietern (</a:t>
-            </a:r>
-            <a:r>
-              <a:rPr lang="de-DE" dirty="0" err="1" smtClean="0"/>
-              <a:t>z.B</a:t>
-            </a:r>
-            <a:r>
-              <a:rPr lang="de-DE" dirty="0" smtClean="0"/>
-              <a:t> </a:t>
-            </a:r>
-            <a:r>
-              <a:rPr lang="de-DE" dirty="0" err="1" smtClean="0"/>
-              <a:t>SonarQube</a:t>
-            </a:r>
-            <a:r>
-              <a:rPr lang="de-DE" dirty="0" smtClean="0"/>
-              <a:t>)</a:t>
+              <a:t>Microsoft Security Code Analysis nur mit Unified/Premier Support</a:t>
             </a:r>
           </a:p>
           <a:p>
@@ -23010,11 +23775,23 @@
             </a:pPr>
             <a:r>
               <a:rPr lang="de-DE" dirty="0"/>
+              <a:t> Nutzen von Drittanbietern (</a:t>
+            </a:r>
+            <a:r>
+              <a:rPr lang="de-DE" dirty="0" err="1"/>
+              <a:t>z.B</a:t>
+            </a:r>
+            <a:r>
+              <a:rPr lang="de-DE" dirty="0"/>
               <a:t> </a:t>
             </a:r>
             <a:r>
+              <a:rPr lang="de-DE" dirty="0" err="1"/>
+              <a:t>SonarQube</a:t>
+            </a:r>
+            <a:r>
               <a:rPr lang="de-DE" dirty="0" smtClean="0"/>
-              <a:t>Microsoft Security Code Analysis nur mit Unified/Premier Support</a:t>
+              <a:t>)</a:t>
             </a:r>
           </a:p>
           <a:p>
@@ -23146,159 +23923,119 @@
   <p:clrMapOvr>
     <a:masterClrMapping/>
   </p:clrMapOvr>
+  <p:timing>
+    <p:tnLst>
+      <p:par>
+        <p:cTn id="1" dur="indefinite" restart="never" nodeType="tmRoot">
+          <p:childTnLst>
+            <p:seq concurrent="1" nextAc="seek">
+              <p:cTn id="2" dur="indefinite" nodeType="mainSeq">
+                <p:childTnLst>
+                  <p:par>
+                    <p:cTn id="3" fill="hold">
+                      <p:stCondLst>
+                        <p:cond delay="indefinite"/>
+                      </p:stCondLst>
+                      <p:childTnLst>
+                        <p:par>
+                          <p:cTn id="4" fill="hold">
+                            <p:stCondLst>
+                              <p:cond delay="0"/>
+                            </p:stCondLst>
+                            <p:childTnLst>
+                              <p:par>
+                                <p:cTn id="5" presetID="1" presetClass="entr" presetSubtype="0" fill="hold" nodeType="clickEffect">
+                                  <p:stCondLst>
+                                    <p:cond delay="0"/>
+                                  </p:stCondLst>
+                                  <p:childTnLst>
+                                    <p:set>
+                                      <p:cBhvr>
+                                        <p:cTn id="6" dur="1" fill="hold">
+                                          <p:stCondLst>
+                                            <p:cond delay="0"/>
+                                          </p:stCondLst>
+                                        </p:cTn>
+                                        <p:tgtEl>
+                                          <p:spTgt spid="3">
+                                            <p:txEl>
+                                              <p:pRg st="8" end="8"/>
+                                            </p:txEl>
+                                          </p:spTgt>
+                                        </p:tgtEl>
+                                        <p:attrNameLst>
+                                          <p:attrName>style.visibility</p:attrName>
+                                        </p:attrNameLst>
+                                      </p:cBhvr>
+                                      <p:to>
+                                        <p:strVal val="visible"/>
+                                      </p:to>
+                                    </p:set>
+                                  </p:childTnLst>
+                                </p:cTn>
+                              </p:par>
+                              <p:par>
+                                <p:cTn id="7" presetID="1" presetClass="entr" presetSubtype="0" fill="hold" grpId="0" nodeType="withEffect">
+                                  <p:stCondLst>
+                                    <p:cond delay="0"/>
+                                  </p:stCondLst>
+                                  <p:childTnLst>
+                                    <p:set>
+                                      <p:cBhvr>
+                                        <p:cTn id="8" dur="1" fill="hold">
+                                          <p:stCondLst>
+                                            <p:cond delay="0"/>
+                                          </p:stCondLst>
+                                        </p:cTn>
+                                        <p:tgtEl>
+                                          <p:spTgt spid="4"/>
+                                        </p:tgtEl>
+                                        <p:attrNameLst>
+                                          <p:attrName>style.visibility</p:attrName>
+                                        </p:attrNameLst>
+                                      </p:cBhvr>
+                                      <p:to>
+                                        <p:strVal val="visible"/>
+                                      </p:to>
+                                    </p:set>
+                                  </p:childTnLst>
+                                </p:cTn>
+                              </p:par>
+                            </p:childTnLst>
+                          </p:cTn>
+                        </p:par>
+                      </p:childTnLst>
+                    </p:cTn>
+                  </p:par>
+                </p:childTnLst>
+              </p:cTn>
+              <p:prevCondLst>
+                <p:cond evt="onPrev" delay="0">
+                  <p:tgtEl>
+                    <p:sldTgt/>
+                  </p:tgtEl>
+                </p:cond>
+              </p:prevCondLst>
+              <p:nextCondLst>
+                <p:cond evt="onNext" delay="0">
+                  <p:tgtEl>
+                    <p:sldTgt/>
+                  </p:tgtEl>
+                </p:cond>
+              </p:nextCondLst>
+            </p:seq>
+          </p:childTnLst>
+        </p:cTn>
+      </p:par>
+    </p:tnLst>
+    <p:bldLst>
+      <p:bldP spid="4" grpId="0" animBg="1"/>
+    </p:bldLst>
+  </p:timing>
 </p:sld>
 </file>
 
-<file path=ppt/slides/slide2.xml><?xml version="1.0" encoding="utf-8"?>
-<p:sld xmlns:a="http://schemas.openxmlformats.org/drawingml/2006/main" xmlns:r="http://schemas.openxmlformats.org/officeDocument/2006/relationships" xmlns:p="http://schemas.openxmlformats.org/presentationml/2006/main">
-  <p:cSld>
-    <p:spTree>
-      <p:nvGrpSpPr>
-        <p:cNvPr id="1" name=""/>
-        <p:cNvGrpSpPr/>
-        <p:nvPr/>
-      </p:nvGrpSpPr>
-      <p:grpSpPr>
-        <a:xfrm>
-          <a:off x="0" y="0"/>
-          <a:ext cx="0" cy="0"/>
-          <a:chOff x="0" y="0"/>
-          <a:chExt cx="0" cy="0"/>
-        </a:xfrm>
-      </p:grpSpPr>
-      <p:sp>
-        <p:nvSpPr>
-          <p:cNvPr id="2" name="Titel 1"/>
-          <p:cNvSpPr>
-            <a:spLocks noGrp="1"/>
-          </p:cNvSpPr>
-          <p:nvPr>
-            <p:ph type="title"/>
-          </p:nvPr>
-        </p:nvSpPr>
-        <p:spPr/>
-        <p:txBody>
-          <a:bodyPr/>
-          <a:lstStyle/>
-          <a:p>
-            <a:r>
-              <a:rPr lang="de-DE" dirty="0" smtClean="0"/>
-              <a:t>Gliederung</a:t>
-            </a:r>
-            <a:endParaRPr lang="de-DE" dirty="0"/>
-          </a:p>
-        </p:txBody>
-      </p:sp>
-      <p:sp>
-        <p:nvSpPr>
-          <p:cNvPr id="3" name="Inhaltsplatzhalter 2"/>
-          <p:cNvSpPr>
-            <a:spLocks noGrp="1"/>
-          </p:cNvSpPr>
-          <p:nvPr>
-            <p:ph idx="1"/>
-          </p:nvPr>
-        </p:nvSpPr>
-        <p:spPr/>
-        <p:txBody>
-          <a:bodyPr/>
-          <a:lstStyle/>
-          <a:p>
-            <a:pPr marL="457200" indent="-457200">
-              <a:buFont typeface="+mj-lt"/>
-              <a:buAutoNum type="arabicPeriod"/>
-            </a:pPr>
-            <a:r>
-              <a:rPr lang="de-DE" dirty="0" smtClean="0"/>
-              <a:t>Chancen und Risiken von </a:t>
-            </a:r>
-            <a:r>
-              <a:rPr lang="de-DE" dirty="0" err="1" smtClean="0"/>
-              <a:t>DevOps</a:t>
-            </a:r>
-            <a:endParaRPr lang="de-DE" dirty="0" smtClean="0"/>
-          </a:p>
-          <a:p>
-            <a:pPr marL="457200" indent="-457200">
-              <a:buFont typeface="+mj-lt"/>
-              <a:buAutoNum type="arabicPeriod"/>
-            </a:pPr>
-            <a:r>
-              <a:rPr lang="de-DE" dirty="0" err="1" smtClean="0"/>
-              <a:t>DevSecOps</a:t>
-            </a:r>
-            <a:endParaRPr lang="de-DE" dirty="0" smtClean="0"/>
-          </a:p>
-          <a:p>
-            <a:pPr marL="457200" indent="-457200">
-              <a:buFont typeface="+mj-lt"/>
-              <a:buAutoNum type="arabicPeriod"/>
-            </a:pPr>
-            <a:r>
-              <a:rPr lang="de-DE" dirty="0" err="1" smtClean="0"/>
-              <a:t>GitHub</a:t>
-            </a:r>
-            <a:r>
-              <a:rPr lang="de-DE" dirty="0" smtClean="0"/>
-              <a:t> </a:t>
-            </a:r>
-          </a:p>
-          <a:p>
-            <a:pPr marL="457200" indent="-457200">
-              <a:buFont typeface="+mj-lt"/>
-              <a:buAutoNum type="arabicPeriod"/>
-            </a:pPr>
-            <a:r>
-              <a:rPr lang="de-DE" dirty="0" err="1" smtClean="0"/>
-              <a:t>Azure</a:t>
-            </a:r>
-            <a:r>
-              <a:rPr lang="de-DE" dirty="0" smtClean="0"/>
-              <a:t> </a:t>
-            </a:r>
-            <a:r>
-              <a:rPr lang="de-DE" dirty="0" err="1" smtClean="0"/>
-              <a:t>DevOps</a:t>
-            </a:r>
-            <a:endParaRPr lang="de-DE" dirty="0" smtClean="0"/>
-          </a:p>
-          <a:p>
-            <a:pPr marL="457200" indent="-457200">
-              <a:buFont typeface="+mj-lt"/>
-              <a:buAutoNum type="arabicPeriod"/>
-            </a:pPr>
-            <a:r>
-              <a:rPr lang="de-DE" dirty="0" smtClean="0"/>
-              <a:t>Vergleich</a:t>
-            </a:r>
-          </a:p>
-          <a:p>
-            <a:pPr marL="457200" indent="-457200">
-              <a:buFont typeface="+mj-lt"/>
-              <a:buAutoNum type="arabicPeriod"/>
-            </a:pPr>
-            <a:r>
-              <a:rPr lang="de-DE" dirty="0" smtClean="0"/>
-              <a:t>Fazit</a:t>
-            </a:r>
-            <a:endParaRPr lang="de-DE" dirty="0"/>
-          </a:p>
-        </p:txBody>
-      </p:sp>
-    </p:spTree>
-    <p:extLst>
-      <p:ext uri="{BB962C8B-B14F-4D97-AF65-F5344CB8AC3E}">
-        <p14:creationId xmlns:p14="http://schemas.microsoft.com/office/powerpoint/2010/main" val="217550076"/>
-      </p:ext>
-    </p:extLst>
-  </p:cSld>
-  <p:clrMapOvr>
-    <a:masterClrMapping/>
-  </p:clrMapOvr>
-</p:sld>
-</file>
-
-<file path=ppt/slides/slide20.xml><?xml version="1.0" encoding="utf-8"?>
+<file path=ppt/slides/slide23.xml><?xml version="1.0" encoding="utf-8"?>
 <p:sld xmlns:a="http://schemas.openxmlformats.org/drawingml/2006/main" xmlns:r="http://schemas.openxmlformats.org/officeDocument/2006/relationships" xmlns:p="http://schemas.openxmlformats.org/presentationml/2006/main">
   <p:cSld>
     <p:spTree>
@@ -23623,10 +24360,17 @@
   <p:clrMapOvr>
     <a:masterClrMapping/>
   </p:clrMapOvr>
+  <p:timing>
+    <p:tnLst>
+      <p:par>
+        <p:cTn id="1" dur="indefinite" restart="never" nodeType="tmRoot"/>
+      </p:par>
+    </p:tnLst>
+  </p:timing>
 </p:sld>
 </file>
 
-<file path=ppt/slides/slide21.xml><?xml version="1.0" encoding="utf-8"?>
+<file path=ppt/slides/slide24.xml><?xml version="1.0" encoding="utf-8"?>
 <p:sld xmlns:a="http://schemas.openxmlformats.org/drawingml/2006/main" xmlns:r="http://schemas.openxmlformats.org/officeDocument/2006/relationships" xmlns:p="http://schemas.openxmlformats.org/presentationml/2006/main">
   <p:cSld>
     <p:spTree>
@@ -23753,10 +24497,17 @@
   <p:clrMapOvr>
     <a:masterClrMapping/>
   </p:clrMapOvr>
+  <p:timing>
+    <p:tnLst>
+      <p:par>
+        <p:cTn id="1" dur="indefinite" restart="never" nodeType="tmRoot"/>
+      </p:par>
+    </p:tnLst>
+  </p:timing>
 </p:sld>
 </file>
 
-<file path=ppt/slides/slide22.xml><?xml version="1.0" encoding="utf-8"?>
+<file path=ppt/slides/slide25.xml><?xml version="1.0" encoding="utf-8"?>
 <p:sld xmlns:a="http://schemas.openxmlformats.org/drawingml/2006/main" xmlns:r="http://schemas.openxmlformats.org/officeDocument/2006/relationships" xmlns:p="http://schemas.openxmlformats.org/presentationml/2006/main">
   <p:cSld>
     <p:spTree>
@@ -23891,10 +24642,287 @@
   <p:clrMapOvr>
     <a:masterClrMapping/>
   </p:clrMapOvr>
+  <p:timing>
+    <p:tnLst>
+      <p:par>
+        <p:cTn id="1" dur="indefinite" restart="never" nodeType="tmRoot"/>
+      </p:par>
+    </p:tnLst>
+  </p:timing>
 </p:sld>
 </file>
 
 <file path=ppt/slides/slide3.xml><?xml version="1.0" encoding="utf-8"?>
+<p:sld xmlns:a="http://schemas.openxmlformats.org/drawingml/2006/main" xmlns:r="http://schemas.openxmlformats.org/officeDocument/2006/relationships" xmlns:p="http://schemas.openxmlformats.org/presentationml/2006/main">
+  <p:cSld>
+    <p:spTree>
+      <p:nvGrpSpPr>
+        <p:cNvPr id="1" name=""/>
+        <p:cNvGrpSpPr/>
+        <p:nvPr/>
+      </p:nvGrpSpPr>
+      <p:grpSpPr>
+        <a:xfrm>
+          <a:off x="0" y="0"/>
+          <a:ext cx="0" cy="0"/>
+          <a:chOff x="0" y="0"/>
+          <a:chExt cx="0" cy="0"/>
+        </a:xfrm>
+      </p:grpSpPr>
+      <p:pic>
+        <p:nvPicPr>
+          <p:cNvPr id="4" name="Inhaltsplatzhalter 3"/>
+          <p:cNvPicPr>
+            <a:picLocks noGrp="1" noChangeAspect="1"/>
+          </p:cNvPicPr>
+          <p:nvPr>
+            <p:ph idx="1"/>
+          </p:nvPr>
+        </p:nvPicPr>
+        <p:blipFill>
+          <a:blip r:embed="rId2">
+            <a:extLst>
+              <a:ext uri="{28A0092B-C50C-407E-A947-70E740481C1C}">
+                <a14:useLocalDpi xmlns:a14="http://schemas.microsoft.com/office/drawing/2010/main" val="0"/>
+              </a:ext>
+            </a:extLst>
+          </a:blip>
+          <a:stretch>
+            <a:fillRect/>
+          </a:stretch>
+        </p:blipFill>
+        <p:spPr>
+          <a:xfrm>
+            <a:off x="2406330" y="98791"/>
+            <a:ext cx="6847540" cy="6539401"/>
+          </a:xfrm>
+        </p:spPr>
+      </p:pic>
+      <p:sp>
+        <p:nvSpPr>
+          <p:cNvPr id="5" name="Rechteck 4"/>
+          <p:cNvSpPr/>
+          <p:nvPr/>
+        </p:nvSpPr>
+        <p:spPr>
+          <a:xfrm>
+            <a:off x="386862" y="536331"/>
+            <a:ext cx="800100" cy="1573823"/>
+          </a:xfrm>
+          <a:prstGeom prst="rect">
+            <a:avLst/>
+          </a:prstGeom>
+          <a:solidFill>
+            <a:schemeClr val="bg1"/>
+          </a:solidFill>
+          <a:ln>
+            <a:solidFill>
+              <a:schemeClr val="bg1"/>
+            </a:solidFill>
+          </a:ln>
+        </p:spPr>
+        <p:style>
+          <a:lnRef idx="2">
+            <a:schemeClr val="accent1">
+              <a:shade val="50000"/>
+            </a:schemeClr>
+          </a:lnRef>
+          <a:fillRef idx="1">
+            <a:schemeClr val="accent1"/>
+          </a:fillRef>
+          <a:effectRef idx="0">
+            <a:schemeClr val="accent1"/>
+          </a:effectRef>
+          <a:fontRef idx="minor">
+            <a:schemeClr val="lt1"/>
+          </a:fontRef>
+        </p:style>
+        <p:txBody>
+          <a:bodyPr rtlCol="0" anchor="ctr"/>
+          <a:lstStyle/>
+          <a:p>
+            <a:pPr algn="ctr"/>
+            <a:endParaRPr lang="de-DE"/>
+          </a:p>
+        </p:txBody>
+      </p:sp>
+    </p:spTree>
+    <p:extLst>
+      <p:ext uri="{BB962C8B-B14F-4D97-AF65-F5344CB8AC3E}">
+        <p14:creationId xmlns:p14="http://schemas.microsoft.com/office/powerpoint/2010/main" val="1924072062"/>
+      </p:ext>
+    </p:extLst>
+  </p:cSld>
+  <p:clrMapOvr>
+    <a:masterClrMapping/>
+  </p:clrMapOvr>
+  <p:timing>
+    <p:tnLst>
+      <p:par>
+        <p:cTn id="1" dur="indefinite" restart="never" nodeType="tmRoot"/>
+      </p:par>
+    </p:tnLst>
+  </p:timing>
+</p:sld>
+</file>
+
+<file path=ppt/slides/slide4.xml><?xml version="1.0" encoding="utf-8"?>
+<p:sld xmlns:a="http://schemas.openxmlformats.org/drawingml/2006/main" xmlns:r="http://schemas.openxmlformats.org/officeDocument/2006/relationships" xmlns:p="http://schemas.openxmlformats.org/presentationml/2006/main">
+  <p:cSld>
+    <p:spTree>
+      <p:nvGrpSpPr>
+        <p:cNvPr id="1" name=""/>
+        <p:cNvGrpSpPr/>
+        <p:nvPr/>
+      </p:nvGrpSpPr>
+      <p:grpSpPr>
+        <a:xfrm>
+          <a:off x="0" y="0"/>
+          <a:ext cx="0" cy="0"/>
+          <a:chOff x="0" y="0"/>
+          <a:chExt cx="0" cy="0"/>
+        </a:xfrm>
+      </p:grpSpPr>
+      <p:sp>
+        <p:nvSpPr>
+          <p:cNvPr id="2" name="Titel 1"/>
+          <p:cNvSpPr>
+            <a:spLocks noGrp="1"/>
+          </p:cNvSpPr>
+          <p:nvPr>
+            <p:ph type="title"/>
+          </p:nvPr>
+        </p:nvSpPr>
+        <p:spPr/>
+        <p:txBody>
+          <a:bodyPr/>
+          <a:lstStyle/>
+          <a:p>
+            <a:r>
+              <a:rPr lang="de-DE" dirty="0" smtClean="0"/>
+              <a:t>Gliederung</a:t>
+            </a:r>
+            <a:endParaRPr lang="de-DE" dirty="0"/>
+          </a:p>
+        </p:txBody>
+      </p:sp>
+      <p:sp>
+        <p:nvSpPr>
+          <p:cNvPr id="3" name="Inhaltsplatzhalter 2"/>
+          <p:cNvSpPr>
+            <a:spLocks noGrp="1"/>
+          </p:cNvSpPr>
+          <p:nvPr>
+            <p:ph idx="1"/>
+          </p:nvPr>
+        </p:nvSpPr>
+        <p:spPr/>
+        <p:txBody>
+          <a:bodyPr/>
+          <a:lstStyle/>
+          <a:p>
+            <a:pPr marL="457200" indent="-457200">
+              <a:buFont typeface="+mj-lt"/>
+              <a:buAutoNum type="arabicPeriod"/>
+            </a:pPr>
+            <a:r>
+              <a:rPr lang="de-DE" dirty="0" smtClean="0"/>
+              <a:t>Chancen und Risiken von </a:t>
+            </a:r>
+            <a:r>
+              <a:rPr lang="de-DE" dirty="0" err="1" smtClean="0"/>
+              <a:t>DevOps</a:t>
+            </a:r>
+            <a:endParaRPr lang="de-DE" dirty="0" smtClean="0"/>
+          </a:p>
+          <a:p>
+            <a:pPr marL="457200" indent="-457200">
+              <a:buFont typeface="+mj-lt"/>
+              <a:buAutoNum type="arabicPeriod"/>
+            </a:pPr>
+            <a:r>
+              <a:rPr lang="de-DE" dirty="0" err="1" smtClean="0"/>
+              <a:t>DevSecOps</a:t>
+            </a:r>
+            <a:endParaRPr lang="de-DE" dirty="0" smtClean="0"/>
+          </a:p>
+          <a:p>
+            <a:pPr marL="457200" indent="-457200">
+              <a:buFont typeface="+mj-lt"/>
+              <a:buAutoNum type="arabicPeriod"/>
+            </a:pPr>
+            <a:r>
+              <a:rPr lang="de-DE" dirty="0" err="1" smtClean="0"/>
+              <a:t>GitHub</a:t>
+            </a:r>
+            <a:r>
+              <a:rPr lang="de-DE" dirty="0" smtClean="0"/>
+              <a:t> </a:t>
+            </a:r>
+          </a:p>
+          <a:p>
+            <a:pPr marL="457200" indent="-457200">
+              <a:buFont typeface="+mj-lt"/>
+              <a:buAutoNum type="arabicPeriod"/>
+            </a:pPr>
+            <a:r>
+              <a:rPr lang="de-DE" dirty="0" err="1" smtClean="0"/>
+              <a:t>Azure</a:t>
+            </a:r>
+            <a:r>
+              <a:rPr lang="de-DE" dirty="0" smtClean="0"/>
+              <a:t> </a:t>
+            </a:r>
+            <a:r>
+              <a:rPr lang="de-DE" dirty="0" err="1" smtClean="0"/>
+              <a:t>DevOps</a:t>
+            </a:r>
+            <a:endParaRPr lang="de-DE" dirty="0" smtClean="0"/>
+          </a:p>
+          <a:p>
+            <a:pPr marL="457200" indent="-457200">
+              <a:buFont typeface="+mj-lt"/>
+              <a:buAutoNum type="arabicPeriod"/>
+            </a:pPr>
+            <a:r>
+              <a:rPr lang="de-DE" dirty="0" smtClean="0"/>
+              <a:t>Vergleich</a:t>
+            </a:r>
+          </a:p>
+          <a:p>
+            <a:pPr marL="457200" indent="-457200">
+              <a:buFont typeface="+mj-lt"/>
+              <a:buAutoNum type="arabicPeriod"/>
+            </a:pPr>
+            <a:r>
+              <a:rPr lang="de-DE" dirty="0" smtClean="0"/>
+              <a:t>Fazit</a:t>
+            </a:r>
+            <a:endParaRPr lang="de-DE" dirty="0"/>
+          </a:p>
+        </p:txBody>
+      </p:sp>
+    </p:spTree>
+    <p:extLst>
+      <p:ext uri="{BB962C8B-B14F-4D97-AF65-F5344CB8AC3E}">
+        <p14:creationId xmlns:p14="http://schemas.microsoft.com/office/powerpoint/2010/main" val="217550076"/>
+      </p:ext>
+    </p:extLst>
+  </p:cSld>
+  <p:clrMapOvr>
+    <a:masterClrMapping/>
+  </p:clrMapOvr>
+  <p:timing>
+    <p:tnLst>
+      <p:par>
+        <p:cTn id="1" dur="indefinite" restart="never" nodeType="tmRoot"/>
+      </p:par>
+    </p:tnLst>
+  </p:timing>
+</p:sld>
+</file>
+
+<file path=ppt/slides/slide5.xml><?xml version="1.0" encoding="utf-8"?>
 <p:sld xmlns:a="http://schemas.openxmlformats.org/drawingml/2006/main" xmlns:r="http://schemas.openxmlformats.org/officeDocument/2006/relationships" xmlns:p="http://schemas.openxmlformats.org/presentationml/2006/main">
   <p:cSld>
     <p:spTree>
@@ -24152,10 +25180,17 @@
   <p:clrMapOvr>
     <a:masterClrMapping/>
   </p:clrMapOvr>
+  <p:timing>
+    <p:tnLst>
+      <p:par>
+        <p:cTn id="1" dur="indefinite" restart="never" nodeType="tmRoot"/>
+      </p:par>
+    </p:tnLst>
+  </p:timing>
 </p:sld>
 </file>
 
-<file path=ppt/slides/slide4.xml><?xml version="1.0" encoding="utf-8"?>
+<file path=ppt/slides/slide6.xml><?xml version="1.0" encoding="utf-8"?>
 <p:sld xmlns:a="http://schemas.openxmlformats.org/drawingml/2006/main" xmlns:r="http://schemas.openxmlformats.org/officeDocument/2006/relationships" xmlns:p="http://schemas.openxmlformats.org/presentationml/2006/main">
   <p:cSld>
     <p:spTree>
@@ -24894,7 +25929,7 @@
         <p:spPr>
           <a:xfrm>
             <a:off x="5339616" y="6192034"/>
-            <a:ext cx="1616590" cy="459961"/>
+            <a:ext cx="1616590" cy="542874"/>
           </a:xfrm>
           <a:prstGeom prst="roundRect">
             <a:avLst/>
@@ -24931,12 +25966,12 @@
               <a:t>Automatisierte </a:t>
             </a:r>
             <a:r>
-              <a:rPr lang="de-DE" dirty="0" err="1" smtClean="0">
+              <a:rPr lang="de-DE" dirty="0" smtClean="0">
                 <a:solidFill>
                   <a:schemeClr val="tx1"/>
                 </a:solidFill>
               </a:rPr>
-              <a:t>Atacken</a:t>
+              <a:t>Attacken</a:t>
             </a:r>
             <a:endParaRPr lang="de-DE" dirty="0">
               <a:solidFill>
@@ -25213,10 +26248,639 @@
   <p:clrMapOvr>
     <a:masterClrMapping/>
   </p:clrMapOvr>
+  <p:timing>
+    <p:tnLst>
+      <p:par>
+        <p:cTn id="1" dur="indefinite" restart="never" nodeType="tmRoot">
+          <p:childTnLst>
+            <p:seq concurrent="1" nextAc="seek">
+              <p:cTn id="2" dur="indefinite" nodeType="mainSeq">
+                <p:childTnLst>
+                  <p:par>
+                    <p:cTn id="3" fill="hold">
+                      <p:stCondLst>
+                        <p:cond delay="indefinite"/>
+                      </p:stCondLst>
+                      <p:childTnLst>
+                        <p:par>
+                          <p:cTn id="4" fill="hold">
+                            <p:stCondLst>
+                              <p:cond delay="0"/>
+                            </p:stCondLst>
+                            <p:childTnLst>
+                              <p:par>
+                                <p:cTn id="5" presetID="1" presetClass="entr" presetSubtype="0" fill="hold" grpId="0" nodeType="clickEffect">
+                                  <p:stCondLst>
+                                    <p:cond delay="0"/>
+                                  </p:stCondLst>
+                                  <p:childTnLst>
+                                    <p:set>
+                                      <p:cBhvr>
+                                        <p:cTn id="6" dur="1" fill="hold">
+                                          <p:stCondLst>
+                                            <p:cond delay="0"/>
+                                          </p:stCondLst>
+                                        </p:cTn>
+                                        <p:tgtEl>
+                                          <p:spTgt spid="11"/>
+                                        </p:tgtEl>
+                                        <p:attrNameLst>
+                                          <p:attrName>style.visibility</p:attrName>
+                                        </p:attrNameLst>
+                                      </p:cBhvr>
+                                      <p:to>
+                                        <p:strVal val="visible"/>
+                                      </p:to>
+                                    </p:set>
+                                  </p:childTnLst>
+                                </p:cTn>
+                              </p:par>
+                            </p:childTnLst>
+                          </p:cTn>
+                        </p:par>
+                      </p:childTnLst>
+                    </p:cTn>
+                  </p:par>
+                  <p:par>
+                    <p:cTn id="7" fill="hold">
+                      <p:stCondLst>
+                        <p:cond delay="indefinite"/>
+                      </p:stCondLst>
+                      <p:childTnLst>
+                        <p:par>
+                          <p:cTn id="8" fill="hold">
+                            <p:stCondLst>
+                              <p:cond delay="0"/>
+                            </p:stCondLst>
+                            <p:childTnLst>
+                              <p:par>
+                                <p:cTn id="9" presetID="1" presetClass="entr" presetSubtype="0" fill="hold" grpId="0" nodeType="clickEffect">
+                                  <p:stCondLst>
+                                    <p:cond delay="0"/>
+                                  </p:stCondLst>
+                                  <p:childTnLst>
+                                    <p:set>
+                                      <p:cBhvr>
+                                        <p:cTn id="10" dur="1" fill="hold">
+                                          <p:stCondLst>
+                                            <p:cond delay="0"/>
+                                          </p:stCondLst>
+                                        </p:cTn>
+                                        <p:tgtEl>
+                                          <p:spTgt spid="12"/>
+                                        </p:tgtEl>
+                                        <p:attrNameLst>
+                                          <p:attrName>style.visibility</p:attrName>
+                                        </p:attrNameLst>
+                                      </p:cBhvr>
+                                      <p:to>
+                                        <p:strVal val="visible"/>
+                                      </p:to>
+                                    </p:set>
+                                  </p:childTnLst>
+                                </p:cTn>
+                              </p:par>
+                            </p:childTnLst>
+                          </p:cTn>
+                        </p:par>
+                      </p:childTnLst>
+                    </p:cTn>
+                  </p:par>
+                  <p:par>
+                    <p:cTn id="11" fill="hold">
+                      <p:stCondLst>
+                        <p:cond delay="indefinite"/>
+                      </p:stCondLst>
+                      <p:childTnLst>
+                        <p:par>
+                          <p:cTn id="12" fill="hold">
+                            <p:stCondLst>
+                              <p:cond delay="0"/>
+                            </p:stCondLst>
+                            <p:childTnLst>
+                              <p:par>
+                                <p:cTn id="13" presetID="1" presetClass="entr" presetSubtype="0" fill="hold" grpId="0" nodeType="clickEffect">
+                                  <p:stCondLst>
+                                    <p:cond delay="0"/>
+                                  </p:stCondLst>
+                                  <p:childTnLst>
+                                    <p:set>
+                                      <p:cBhvr>
+                                        <p:cTn id="14" dur="1" fill="hold">
+                                          <p:stCondLst>
+                                            <p:cond delay="0"/>
+                                          </p:stCondLst>
+                                        </p:cTn>
+                                        <p:tgtEl>
+                                          <p:spTgt spid="10"/>
+                                        </p:tgtEl>
+                                        <p:attrNameLst>
+                                          <p:attrName>style.visibility</p:attrName>
+                                        </p:attrNameLst>
+                                      </p:cBhvr>
+                                      <p:to>
+                                        <p:strVal val="visible"/>
+                                      </p:to>
+                                    </p:set>
+                                  </p:childTnLst>
+                                </p:cTn>
+                              </p:par>
+                            </p:childTnLst>
+                          </p:cTn>
+                        </p:par>
+                      </p:childTnLst>
+                    </p:cTn>
+                  </p:par>
+                  <p:par>
+                    <p:cTn id="15" fill="hold">
+                      <p:stCondLst>
+                        <p:cond delay="indefinite"/>
+                      </p:stCondLst>
+                      <p:childTnLst>
+                        <p:par>
+                          <p:cTn id="16" fill="hold">
+                            <p:stCondLst>
+                              <p:cond delay="0"/>
+                            </p:stCondLst>
+                            <p:childTnLst>
+                              <p:par>
+                                <p:cTn id="17" presetID="1" presetClass="entr" presetSubtype="0" fill="hold" nodeType="clickEffect">
+                                  <p:stCondLst>
+                                    <p:cond delay="0"/>
+                                  </p:stCondLst>
+                                  <p:childTnLst>
+                                    <p:set>
+                                      <p:cBhvr>
+                                        <p:cTn id="18" dur="1" fill="hold">
+                                          <p:stCondLst>
+                                            <p:cond delay="0"/>
+                                          </p:stCondLst>
+                                        </p:cTn>
+                                        <p:tgtEl>
+                                          <p:spTgt spid="21"/>
+                                        </p:tgtEl>
+                                        <p:attrNameLst>
+                                          <p:attrName>style.visibility</p:attrName>
+                                        </p:attrNameLst>
+                                      </p:cBhvr>
+                                      <p:to>
+                                        <p:strVal val="visible"/>
+                                      </p:to>
+                                    </p:set>
+                                  </p:childTnLst>
+                                </p:cTn>
+                              </p:par>
+                              <p:par>
+                                <p:cTn id="19" presetID="1" presetClass="entr" presetSubtype="0" fill="hold" grpId="0" nodeType="withEffect">
+                                  <p:stCondLst>
+                                    <p:cond delay="0"/>
+                                  </p:stCondLst>
+                                  <p:childTnLst>
+                                    <p:set>
+                                      <p:cBhvr>
+                                        <p:cTn id="20" dur="1" fill="hold">
+                                          <p:stCondLst>
+                                            <p:cond delay="0"/>
+                                          </p:stCondLst>
+                                        </p:cTn>
+                                        <p:tgtEl>
+                                          <p:spTgt spid="15"/>
+                                        </p:tgtEl>
+                                        <p:attrNameLst>
+                                          <p:attrName>style.visibility</p:attrName>
+                                        </p:attrNameLst>
+                                      </p:cBhvr>
+                                      <p:to>
+                                        <p:strVal val="visible"/>
+                                      </p:to>
+                                    </p:set>
+                                  </p:childTnLst>
+                                </p:cTn>
+                              </p:par>
+                            </p:childTnLst>
+                          </p:cTn>
+                        </p:par>
+                      </p:childTnLst>
+                    </p:cTn>
+                  </p:par>
+                  <p:par>
+                    <p:cTn id="21" fill="hold">
+                      <p:stCondLst>
+                        <p:cond delay="indefinite"/>
+                      </p:stCondLst>
+                      <p:childTnLst>
+                        <p:par>
+                          <p:cTn id="22" fill="hold">
+                            <p:stCondLst>
+                              <p:cond delay="0"/>
+                            </p:stCondLst>
+                            <p:childTnLst>
+                              <p:par>
+                                <p:cTn id="23" presetID="1" presetClass="entr" presetSubtype="0" fill="hold" nodeType="clickEffect">
+                                  <p:stCondLst>
+                                    <p:cond delay="0"/>
+                                  </p:stCondLst>
+                                  <p:childTnLst>
+                                    <p:set>
+                                      <p:cBhvr>
+                                        <p:cTn id="24" dur="1" fill="hold">
+                                          <p:stCondLst>
+                                            <p:cond delay="0"/>
+                                          </p:stCondLst>
+                                        </p:cTn>
+                                        <p:tgtEl>
+                                          <p:spTgt spid="23"/>
+                                        </p:tgtEl>
+                                        <p:attrNameLst>
+                                          <p:attrName>style.visibility</p:attrName>
+                                        </p:attrNameLst>
+                                      </p:cBhvr>
+                                      <p:to>
+                                        <p:strVal val="visible"/>
+                                      </p:to>
+                                    </p:set>
+                                  </p:childTnLst>
+                                </p:cTn>
+                              </p:par>
+                              <p:par>
+                                <p:cTn id="25" presetID="1" presetClass="entr" presetSubtype="0" fill="hold" grpId="0" nodeType="withEffect">
+                                  <p:stCondLst>
+                                    <p:cond delay="0"/>
+                                  </p:stCondLst>
+                                  <p:childTnLst>
+                                    <p:set>
+                                      <p:cBhvr>
+                                        <p:cTn id="26" dur="1" fill="hold">
+                                          <p:stCondLst>
+                                            <p:cond delay="0"/>
+                                          </p:stCondLst>
+                                        </p:cTn>
+                                        <p:tgtEl>
+                                          <p:spTgt spid="14"/>
+                                        </p:tgtEl>
+                                        <p:attrNameLst>
+                                          <p:attrName>style.visibility</p:attrName>
+                                        </p:attrNameLst>
+                                      </p:cBhvr>
+                                      <p:to>
+                                        <p:strVal val="visible"/>
+                                      </p:to>
+                                    </p:set>
+                                  </p:childTnLst>
+                                </p:cTn>
+                              </p:par>
+                            </p:childTnLst>
+                          </p:cTn>
+                        </p:par>
+                      </p:childTnLst>
+                    </p:cTn>
+                  </p:par>
+                  <p:par>
+                    <p:cTn id="27" fill="hold">
+                      <p:stCondLst>
+                        <p:cond delay="indefinite"/>
+                      </p:stCondLst>
+                      <p:childTnLst>
+                        <p:par>
+                          <p:cTn id="28" fill="hold">
+                            <p:stCondLst>
+                              <p:cond delay="0"/>
+                            </p:stCondLst>
+                            <p:childTnLst>
+                              <p:par>
+                                <p:cTn id="29" presetID="1" presetClass="entr" presetSubtype="0" fill="hold" nodeType="clickEffect">
+                                  <p:stCondLst>
+                                    <p:cond delay="0"/>
+                                  </p:stCondLst>
+                                  <p:childTnLst>
+                                    <p:set>
+                                      <p:cBhvr>
+                                        <p:cTn id="30" dur="1" fill="hold">
+                                          <p:stCondLst>
+                                            <p:cond delay="0"/>
+                                          </p:stCondLst>
+                                        </p:cTn>
+                                        <p:tgtEl>
+                                          <p:spTgt spid="25"/>
+                                        </p:tgtEl>
+                                        <p:attrNameLst>
+                                          <p:attrName>style.visibility</p:attrName>
+                                        </p:attrNameLst>
+                                      </p:cBhvr>
+                                      <p:to>
+                                        <p:strVal val="visible"/>
+                                      </p:to>
+                                    </p:set>
+                                  </p:childTnLst>
+                                </p:cTn>
+                              </p:par>
+                              <p:par>
+                                <p:cTn id="31" presetID="1" presetClass="entr" presetSubtype="0" fill="hold" grpId="0" nodeType="withEffect">
+                                  <p:stCondLst>
+                                    <p:cond delay="0"/>
+                                  </p:stCondLst>
+                                  <p:childTnLst>
+                                    <p:set>
+                                      <p:cBhvr>
+                                        <p:cTn id="32" dur="1" fill="hold">
+                                          <p:stCondLst>
+                                            <p:cond delay="0"/>
+                                          </p:stCondLst>
+                                        </p:cTn>
+                                        <p:tgtEl>
+                                          <p:spTgt spid="13"/>
+                                        </p:tgtEl>
+                                        <p:attrNameLst>
+                                          <p:attrName>style.visibility</p:attrName>
+                                        </p:attrNameLst>
+                                      </p:cBhvr>
+                                      <p:to>
+                                        <p:strVal val="visible"/>
+                                      </p:to>
+                                    </p:set>
+                                  </p:childTnLst>
+                                </p:cTn>
+                              </p:par>
+                            </p:childTnLst>
+                          </p:cTn>
+                        </p:par>
+                      </p:childTnLst>
+                    </p:cTn>
+                  </p:par>
+                  <p:par>
+                    <p:cTn id="33" fill="hold">
+                      <p:stCondLst>
+                        <p:cond delay="indefinite"/>
+                      </p:stCondLst>
+                      <p:childTnLst>
+                        <p:par>
+                          <p:cTn id="34" fill="hold">
+                            <p:stCondLst>
+                              <p:cond delay="0"/>
+                            </p:stCondLst>
+                            <p:childTnLst>
+                              <p:par>
+                                <p:cTn id="35" presetID="1" presetClass="entr" presetSubtype="0" fill="hold" grpId="0" nodeType="clickEffect">
+                                  <p:stCondLst>
+                                    <p:cond delay="0"/>
+                                  </p:stCondLst>
+                                  <p:childTnLst>
+                                    <p:set>
+                                      <p:cBhvr>
+                                        <p:cTn id="36" dur="1" fill="hold">
+                                          <p:stCondLst>
+                                            <p:cond delay="0"/>
+                                          </p:stCondLst>
+                                        </p:cTn>
+                                        <p:tgtEl>
+                                          <p:spTgt spid="16"/>
+                                        </p:tgtEl>
+                                        <p:attrNameLst>
+                                          <p:attrName>style.visibility</p:attrName>
+                                        </p:attrNameLst>
+                                      </p:cBhvr>
+                                      <p:to>
+                                        <p:strVal val="visible"/>
+                                      </p:to>
+                                    </p:set>
+                                  </p:childTnLst>
+                                </p:cTn>
+                              </p:par>
+                            </p:childTnLst>
+                          </p:cTn>
+                        </p:par>
+                      </p:childTnLst>
+                    </p:cTn>
+                  </p:par>
+                  <p:par>
+                    <p:cTn id="37" fill="hold">
+                      <p:stCondLst>
+                        <p:cond delay="indefinite"/>
+                      </p:stCondLst>
+                      <p:childTnLst>
+                        <p:par>
+                          <p:cTn id="38" fill="hold">
+                            <p:stCondLst>
+                              <p:cond delay="0"/>
+                            </p:stCondLst>
+                            <p:childTnLst>
+                              <p:par>
+                                <p:cTn id="39" presetID="1" presetClass="entr" presetSubtype="0" fill="hold" grpId="0" nodeType="clickEffect">
+                                  <p:stCondLst>
+                                    <p:cond delay="0"/>
+                                  </p:stCondLst>
+                                  <p:childTnLst>
+                                    <p:set>
+                                      <p:cBhvr>
+                                        <p:cTn id="40" dur="1" fill="hold">
+                                          <p:stCondLst>
+                                            <p:cond delay="0"/>
+                                          </p:stCondLst>
+                                        </p:cTn>
+                                        <p:tgtEl>
+                                          <p:spTgt spid="17"/>
+                                        </p:tgtEl>
+                                        <p:attrNameLst>
+                                          <p:attrName>style.visibility</p:attrName>
+                                        </p:attrNameLst>
+                                      </p:cBhvr>
+                                      <p:to>
+                                        <p:strVal val="visible"/>
+                                      </p:to>
+                                    </p:set>
+                                  </p:childTnLst>
+                                </p:cTn>
+                              </p:par>
+                              <p:par>
+                                <p:cTn id="41" presetID="1" presetClass="entr" presetSubtype="0" fill="hold" grpId="0" nodeType="withEffect">
+                                  <p:stCondLst>
+                                    <p:cond delay="0"/>
+                                  </p:stCondLst>
+                                  <p:childTnLst>
+                                    <p:set>
+                                      <p:cBhvr>
+                                        <p:cTn id="42" dur="1" fill="hold">
+                                          <p:stCondLst>
+                                            <p:cond delay="0"/>
+                                          </p:stCondLst>
+                                        </p:cTn>
+                                        <p:tgtEl>
+                                          <p:spTgt spid="18"/>
+                                        </p:tgtEl>
+                                        <p:attrNameLst>
+                                          <p:attrName>style.visibility</p:attrName>
+                                        </p:attrNameLst>
+                                      </p:cBhvr>
+                                      <p:to>
+                                        <p:strVal val="visible"/>
+                                      </p:to>
+                                    </p:set>
+                                  </p:childTnLst>
+                                </p:cTn>
+                              </p:par>
+                            </p:childTnLst>
+                          </p:cTn>
+                        </p:par>
+                      </p:childTnLst>
+                    </p:cTn>
+                  </p:par>
+                  <p:par>
+                    <p:cTn id="43" fill="hold">
+                      <p:stCondLst>
+                        <p:cond delay="indefinite"/>
+                      </p:stCondLst>
+                      <p:childTnLst>
+                        <p:par>
+                          <p:cTn id="44" fill="hold">
+                            <p:stCondLst>
+                              <p:cond delay="0"/>
+                            </p:stCondLst>
+                            <p:childTnLst>
+                              <p:par>
+                                <p:cTn id="45" presetID="1" presetClass="entr" presetSubtype="0" fill="hold" grpId="0" nodeType="clickEffect">
+                                  <p:stCondLst>
+                                    <p:cond delay="0"/>
+                                  </p:stCondLst>
+                                  <p:childTnLst>
+                                    <p:set>
+                                      <p:cBhvr>
+                                        <p:cTn id="46" dur="1" fill="hold">
+                                          <p:stCondLst>
+                                            <p:cond delay="0"/>
+                                          </p:stCondLst>
+                                        </p:cTn>
+                                        <p:tgtEl>
+                                          <p:spTgt spid="19"/>
+                                        </p:tgtEl>
+                                        <p:attrNameLst>
+                                          <p:attrName>style.visibility</p:attrName>
+                                        </p:attrNameLst>
+                                      </p:cBhvr>
+                                      <p:to>
+                                        <p:strVal val="visible"/>
+                                      </p:to>
+                                    </p:set>
+                                  </p:childTnLst>
+                                </p:cTn>
+                              </p:par>
+                            </p:childTnLst>
+                          </p:cTn>
+                        </p:par>
+                      </p:childTnLst>
+                    </p:cTn>
+                  </p:par>
+                  <p:par>
+                    <p:cTn id="47" fill="hold">
+                      <p:stCondLst>
+                        <p:cond delay="indefinite"/>
+                      </p:stCondLst>
+                      <p:childTnLst>
+                        <p:par>
+                          <p:cTn id="48" fill="hold">
+                            <p:stCondLst>
+                              <p:cond delay="0"/>
+                            </p:stCondLst>
+                            <p:childTnLst>
+                              <p:par>
+                                <p:cTn id="49" presetID="1" presetClass="entr" presetSubtype="0" fill="hold" grpId="0" nodeType="clickEffect">
+                                  <p:stCondLst>
+                                    <p:cond delay="0"/>
+                                  </p:stCondLst>
+                                  <p:childTnLst>
+                                    <p:set>
+                                      <p:cBhvr>
+                                        <p:cTn id="50" dur="1" fill="hold">
+                                          <p:stCondLst>
+                                            <p:cond delay="0"/>
+                                          </p:stCondLst>
+                                        </p:cTn>
+                                        <p:tgtEl>
+                                          <p:spTgt spid="20"/>
+                                        </p:tgtEl>
+                                        <p:attrNameLst>
+                                          <p:attrName>style.visibility</p:attrName>
+                                        </p:attrNameLst>
+                                      </p:cBhvr>
+                                      <p:to>
+                                        <p:strVal val="visible"/>
+                                      </p:to>
+                                    </p:set>
+                                  </p:childTnLst>
+                                </p:cTn>
+                              </p:par>
+                              <p:par>
+                                <p:cTn id="51" presetID="1" presetClass="entr" presetSubtype="0" fill="hold" grpId="0" nodeType="withEffect">
+                                  <p:stCondLst>
+                                    <p:cond delay="0"/>
+                                  </p:stCondLst>
+                                  <p:childTnLst>
+                                    <p:set>
+                                      <p:cBhvr>
+                                        <p:cTn id="52" dur="1" fill="hold">
+                                          <p:stCondLst>
+                                            <p:cond delay="0"/>
+                                          </p:stCondLst>
+                                        </p:cTn>
+                                        <p:tgtEl>
+                                          <p:spTgt spid="29"/>
+                                        </p:tgtEl>
+                                        <p:attrNameLst>
+                                          <p:attrName>style.visibility</p:attrName>
+                                        </p:attrNameLst>
+                                      </p:cBhvr>
+                                      <p:to>
+                                        <p:strVal val="visible"/>
+                                      </p:to>
+                                    </p:set>
+                                  </p:childTnLst>
+                                </p:cTn>
+                              </p:par>
+                            </p:childTnLst>
+                          </p:cTn>
+                        </p:par>
+                      </p:childTnLst>
+                    </p:cTn>
+                  </p:par>
+                </p:childTnLst>
+              </p:cTn>
+              <p:prevCondLst>
+                <p:cond evt="onPrev" delay="0">
+                  <p:tgtEl>
+                    <p:sldTgt/>
+                  </p:tgtEl>
+                </p:cond>
+              </p:prevCondLst>
+              <p:nextCondLst>
+                <p:cond evt="onNext" delay="0">
+                  <p:tgtEl>
+                    <p:sldTgt/>
+                  </p:tgtEl>
+                </p:cond>
+              </p:nextCondLst>
+            </p:seq>
+          </p:childTnLst>
+        </p:cTn>
+      </p:par>
+    </p:tnLst>
+    <p:bldLst>
+      <p:bldP spid="10" grpId="0" animBg="1"/>
+      <p:bldP spid="11" grpId="0" animBg="1"/>
+      <p:bldP spid="12" grpId="0" animBg="1"/>
+      <p:bldP spid="13" grpId="0" animBg="1"/>
+      <p:bldP spid="14" grpId="0" animBg="1"/>
+      <p:bldP spid="15" grpId="0" animBg="1"/>
+      <p:bldP spid="16" grpId="0" animBg="1"/>
+      <p:bldP spid="17" grpId="0" animBg="1"/>
+      <p:bldP spid="18" grpId="0" animBg="1"/>
+      <p:bldP spid="19" grpId="0" animBg="1"/>
+      <p:bldP spid="20" grpId="0" animBg="1"/>
+      <p:bldP spid="29" grpId="0" animBg="1"/>
+    </p:bldLst>
+  </p:timing>
 </p:sld>
 </file>
 
-<file path=ppt/slides/slide5.xml><?xml version="1.0" encoding="utf-8"?>
+<file path=ppt/slides/slide7.xml><?xml version="1.0" encoding="utf-8"?>
 <p:sld xmlns:a="http://schemas.openxmlformats.org/drawingml/2006/main" xmlns:r="http://schemas.openxmlformats.org/officeDocument/2006/relationships" xmlns:p="http://schemas.openxmlformats.org/presentationml/2006/main">
   <p:cSld>
     <p:spTree>
@@ -25482,10 +27146,17 @@
   <p:clrMapOvr>
     <a:masterClrMapping/>
   </p:clrMapOvr>
+  <p:timing>
+    <p:tnLst>
+      <p:par>
+        <p:cTn id="1" dur="indefinite" restart="never" nodeType="tmRoot"/>
+      </p:par>
+    </p:tnLst>
+  </p:timing>
 </p:sld>
 </file>
 
-<file path=ppt/slides/slide6.xml><?xml version="1.0" encoding="utf-8"?>
+<file path=ppt/slides/slide8.xml><?xml version="1.0" encoding="utf-8"?>
 <p:sld xmlns:a="http://schemas.openxmlformats.org/drawingml/2006/main" xmlns:r="http://schemas.openxmlformats.org/officeDocument/2006/relationships" xmlns:p="http://schemas.openxmlformats.org/presentationml/2006/main">
   <p:cSld>
     <p:spTree>
@@ -25668,10 +27339,182 @@
   <p:clrMapOvr>
     <a:masterClrMapping/>
   </p:clrMapOvr>
+  <p:timing>
+    <p:tnLst>
+      <p:par>
+        <p:cTn id="1" dur="indefinite" restart="never" nodeType="tmRoot">
+          <p:childTnLst>
+            <p:seq concurrent="1" nextAc="seek">
+              <p:cTn id="2" dur="indefinite" nodeType="mainSeq">
+                <p:childTnLst>
+                  <p:par>
+                    <p:cTn id="3" fill="hold">
+                      <p:stCondLst>
+                        <p:cond delay="indefinite"/>
+                      </p:stCondLst>
+                      <p:childTnLst>
+                        <p:par>
+                          <p:cTn id="4" fill="hold">
+                            <p:stCondLst>
+                              <p:cond delay="0"/>
+                            </p:stCondLst>
+                            <p:childTnLst>
+                              <p:par>
+                                <p:cTn id="5" presetID="1" presetClass="entr" presetSubtype="0" fill="hold" nodeType="clickEffect">
+                                  <p:stCondLst>
+                                    <p:cond delay="0"/>
+                                  </p:stCondLst>
+                                  <p:childTnLst>
+                                    <p:set>
+                                      <p:cBhvr>
+                                        <p:cTn id="6" dur="1" fill="hold">
+                                          <p:stCondLst>
+                                            <p:cond delay="0"/>
+                                          </p:stCondLst>
+                                        </p:cTn>
+                                        <p:tgtEl>
+                                          <p:spTgt spid="3">
+                                            <p:txEl>
+                                              <p:pRg st="5" end="5"/>
+                                            </p:txEl>
+                                          </p:spTgt>
+                                        </p:tgtEl>
+                                        <p:attrNameLst>
+                                          <p:attrName>style.visibility</p:attrName>
+                                        </p:attrNameLst>
+                                      </p:cBhvr>
+                                      <p:to>
+                                        <p:strVal val="visible"/>
+                                      </p:to>
+                                    </p:set>
+                                  </p:childTnLst>
+                                </p:cTn>
+                              </p:par>
+                              <p:par>
+                                <p:cTn id="7" presetID="1" presetClass="entr" presetSubtype="0" fill="hold" nodeType="withEffect">
+                                  <p:stCondLst>
+                                    <p:cond delay="0"/>
+                                  </p:stCondLst>
+                                  <p:childTnLst>
+                                    <p:set>
+                                      <p:cBhvr>
+                                        <p:cTn id="8" dur="1" fill="hold">
+                                          <p:stCondLst>
+                                            <p:cond delay="0"/>
+                                          </p:stCondLst>
+                                        </p:cTn>
+                                        <p:tgtEl>
+                                          <p:spTgt spid="3">
+                                            <p:txEl>
+                                              <p:pRg st="6" end="6"/>
+                                            </p:txEl>
+                                          </p:spTgt>
+                                        </p:tgtEl>
+                                        <p:attrNameLst>
+                                          <p:attrName>style.visibility</p:attrName>
+                                        </p:attrNameLst>
+                                      </p:cBhvr>
+                                      <p:to>
+                                        <p:strVal val="visible"/>
+                                      </p:to>
+                                    </p:set>
+                                  </p:childTnLst>
+                                </p:cTn>
+                              </p:par>
+                              <p:par>
+                                <p:cTn id="9" presetID="1" presetClass="entr" presetSubtype="0" fill="hold" nodeType="withEffect">
+                                  <p:stCondLst>
+                                    <p:cond delay="0"/>
+                                  </p:stCondLst>
+                                  <p:childTnLst>
+                                    <p:set>
+                                      <p:cBhvr>
+                                        <p:cTn id="10" dur="1" fill="hold">
+                                          <p:stCondLst>
+                                            <p:cond delay="0"/>
+                                          </p:stCondLst>
+                                        </p:cTn>
+                                        <p:tgtEl>
+                                          <p:spTgt spid="3">
+                                            <p:txEl>
+                                              <p:pRg st="7" end="7"/>
+                                            </p:txEl>
+                                          </p:spTgt>
+                                        </p:tgtEl>
+                                        <p:attrNameLst>
+                                          <p:attrName>style.visibility</p:attrName>
+                                        </p:attrNameLst>
+                                      </p:cBhvr>
+                                      <p:to>
+                                        <p:strVal val="visible"/>
+                                      </p:to>
+                                    </p:set>
+                                  </p:childTnLst>
+                                </p:cTn>
+                              </p:par>
+                              <p:par>
+                                <p:cTn id="11" presetID="1" presetClass="entr" presetSubtype="0" fill="hold" nodeType="withEffect">
+                                  <p:stCondLst>
+                                    <p:cond delay="0"/>
+                                  </p:stCondLst>
+                                  <p:childTnLst>
+                                    <p:set>
+                                      <p:cBhvr>
+                                        <p:cTn id="12" dur="1" fill="hold">
+                                          <p:stCondLst>
+                                            <p:cond delay="0"/>
+                                          </p:stCondLst>
+                                        </p:cTn>
+                                        <p:tgtEl>
+                                          <p:spTgt spid="3">
+                                            <p:txEl>
+                                              <p:pRg st="8" end="8"/>
+                                            </p:txEl>
+                                          </p:spTgt>
+                                        </p:tgtEl>
+                                        <p:attrNameLst>
+                                          <p:attrName>style.visibility</p:attrName>
+                                        </p:attrNameLst>
+                                      </p:cBhvr>
+                                      <p:to>
+                                        <p:strVal val="visible"/>
+                                      </p:to>
+                                    </p:set>
+                                  </p:childTnLst>
+                                </p:cTn>
+                              </p:par>
+                            </p:childTnLst>
+                          </p:cTn>
+                        </p:par>
+                      </p:childTnLst>
+                    </p:cTn>
+                  </p:par>
+                </p:childTnLst>
+              </p:cTn>
+              <p:prevCondLst>
+                <p:cond evt="onPrev" delay="0">
+                  <p:tgtEl>
+                    <p:sldTgt/>
+                  </p:tgtEl>
+                </p:cond>
+              </p:prevCondLst>
+              <p:nextCondLst>
+                <p:cond evt="onNext" delay="0">
+                  <p:tgtEl>
+                    <p:sldTgt/>
+                  </p:tgtEl>
+                </p:cond>
+              </p:nextCondLst>
+            </p:seq>
+          </p:childTnLst>
+        </p:cTn>
+      </p:par>
+    </p:tnLst>
+  </p:timing>
 </p:sld>
 </file>
 
-<file path=ppt/slides/slide7.xml><?xml version="1.0" encoding="utf-8"?>
+<file path=ppt/slides/slide9.xml><?xml version="1.0" encoding="utf-8"?>
 <p:sld xmlns:a="http://schemas.openxmlformats.org/drawingml/2006/main" xmlns:r="http://schemas.openxmlformats.org/officeDocument/2006/relationships" xmlns:p="http://schemas.openxmlformats.org/presentationml/2006/main">
   <p:cSld>
     <p:spTree>
@@ -25752,360 +27595,13 @@
   <p:clrMapOvr>
     <a:masterClrMapping/>
   </p:clrMapOvr>
-</p:sld>
-</file>
-
-<file path=ppt/slides/slide8.xml><?xml version="1.0" encoding="utf-8"?>
-<p:sld xmlns:a="http://schemas.openxmlformats.org/drawingml/2006/main" xmlns:r="http://schemas.openxmlformats.org/officeDocument/2006/relationships" xmlns:p="http://schemas.openxmlformats.org/presentationml/2006/main">
-  <p:cSld>
-    <p:spTree>
-      <p:nvGrpSpPr>
-        <p:cNvPr id="1" name=""/>
-        <p:cNvGrpSpPr/>
-        <p:nvPr/>
-      </p:nvGrpSpPr>
-      <p:grpSpPr>
-        <a:xfrm>
-          <a:off x="0" y="0"/>
-          <a:ext cx="0" cy="0"/>
-          <a:chOff x="0" y="0"/>
-          <a:chExt cx="0" cy="0"/>
-        </a:xfrm>
-      </p:grpSpPr>
-      <p:sp>
-        <p:nvSpPr>
-          <p:cNvPr id="4" name="Titel 3"/>
-          <p:cNvSpPr>
-            <a:spLocks noGrp="1"/>
-          </p:cNvSpPr>
-          <p:nvPr>
-            <p:ph type="title"/>
-          </p:nvPr>
-        </p:nvSpPr>
-        <p:spPr/>
-        <p:txBody>
-          <a:bodyPr/>
-          <a:lstStyle/>
-          <a:p>
-            <a:r>
-              <a:rPr lang="de-DE" dirty="0" smtClean="0"/>
-              <a:t>Security in </a:t>
-            </a:r>
-            <a:r>
-              <a:rPr lang="de-DE" dirty="0" err="1" smtClean="0"/>
-              <a:t>Github</a:t>
-            </a:r>
-            <a:endParaRPr lang="de-DE" dirty="0"/>
-          </a:p>
-        </p:txBody>
-      </p:sp>
-      <p:pic>
-        <p:nvPicPr>
-          <p:cNvPr id="2" name="Grafik 1"/>
-          <p:cNvPicPr>
-            <a:picLocks noChangeAspect="1"/>
-          </p:cNvPicPr>
-          <p:nvPr/>
-        </p:nvPicPr>
-        <p:blipFill>
-          <a:blip r:embed="rId3">
-            <a:extLst>
-              <a:ext uri="{28A0092B-C50C-407E-A947-70E740481C1C}">
-                <a14:useLocalDpi xmlns:a14="http://schemas.microsoft.com/office/drawing/2010/main" val="0"/>
-              </a:ext>
-            </a:extLst>
-          </a:blip>
-          <a:stretch>
-            <a:fillRect/>
-          </a:stretch>
-        </p:blipFill>
-        <p:spPr>
-          <a:xfrm>
-            <a:off x="1514625" y="870007"/>
-            <a:ext cx="8739078" cy="6752924"/>
-          </a:xfrm>
-          <a:prstGeom prst="rect">
-            <a:avLst/>
-          </a:prstGeom>
-        </p:spPr>
-      </p:pic>
-    </p:spTree>
-    <p:extLst>
-      <p:ext uri="{BB962C8B-B14F-4D97-AF65-F5344CB8AC3E}">
-        <p14:creationId xmlns:p14="http://schemas.microsoft.com/office/powerpoint/2010/main" val="1077076356"/>
-      </p:ext>
-    </p:extLst>
-  </p:cSld>
-  <p:clrMapOvr>
-    <a:masterClrMapping/>
-  </p:clrMapOvr>
-</p:sld>
-</file>
-
-<file path=ppt/slides/slide9.xml><?xml version="1.0" encoding="utf-8"?>
-<p:sld xmlns:a="http://schemas.openxmlformats.org/drawingml/2006/main" xmlns:r="http://schemas.openxmlformats.org/officeDocument/2006/relationships" xmlns:p="http://schemas.openxmlformats.org/presentationml/2006/main">
-  <p:cSld>
-    <p:spTree>
-      <p:nvGrpSpPr>
-        <p:cNvPr id="1" name=""/>
-        <p:cNvGrpSpPr/>
-        <p:nvPr/>
-      </p:nvGrpSpPr>
-      <p:grpSpPr>
-        <a:xfrm>
-          <a:off x="0" y="0"/>
-          <a:ext cx="0" cy="0"/>
-          <a:chOff x="0" y="0"/>
-          <a:chExt cx="0" cy="0"/>
-        </a:xfrm>
-      </p:grpSpPr>
-      <p:sp>
-        <p:nvSpPr>
-          <p:cNvPr id="2" name="Titel 1"/>
-          <p:cNvSpPr>
-            <a:spLocks noGrp="1"/>
-          </p:cNvSpPr>
-          <p:nvPr>
-            <p:ph type="title"/>
-          </p:nvPr>
-        </p:nvSpPr>
-        <p:spPr/>
-        <p:txBody>
-          <a:bodyPr/>
-          <a:lstStyle/>
-          <a:p>
-            <a:r>
-              <a:rPr lang="de-DE" dirty="0" smtClean="0"/>
-              <a:t>Secret </a:t>
-            </a:r>
-            <a:r>
-              <a:rPr lang="de-DE" dirty="0" err="1" smtClean="0"/>
-              <a:t>scanning</a:t>
-            </a:r>
-            <a:endParaRPr lang="de-DE" dirty="0"/>
-          </a:p>
-        </p:txBody>
-      </p:sp>
-      <p:sp>
-        <p:nvSpPr>
-          <p:cNvPr id="3" name="Inhaltsplatzhalter 2"/>
-          <p:cNvSpPr>
-            <a:spLocks noGrp="1"/>
-          </p:cNvSpPr>
-          <p:nvPr>
-            <p:ph idx="1"/>
-          </p:nvPr>
-        </p:nvSpPr>
-        <p:spPr>
-          <a:xfrm>
-            <a:off x="1024128" y="3543300"/>
-            <a:ext cx="9720073" cy="4023360"/>
-          </a:xfrm>
-        </p:spPr>
-        <p:txBody>
-          <a:bodyPr/>
-          <a:lstStyle/>
-          <a:p>
-            <a:pPr>
-              <a:buFont typeface="Wingdings" panose="05000000000000000000" pitchFamily="2" charset="2"/>
-              <a:buChar char="v"/>
-            </a:pPr>
-            <a:r>
-              <a:rPr lang="de-DE" dirty="0" smtClean="0"/>
-              <a:t> Secret Scanning überprüft, ob </a:t>
-            </a:r>
-            <a:r>
-              <a:rPr lang="de-DE" dirty="0" err="1" smtClean="0"/>
-              <a:t>Secrets</a:t>
-            </a:r>
-            <a:r>
-              <a:rPr lang="de-DE" dirty="0" smtClean="0"/>
-              <a:t> im Repository liegen.</a:t>
-            </a:r>
-          </a:p>
-          <a:p>
-            <a:pPr>
-              <a:buFont typeface="Wingdings" panose="05000000000000000000" pitchFamily="2" charset="2"/>
-              <a:buChar char="v"/>
-            </a:pPr>
-            <a:r>
-              <a:rPr lang="de-DE" dirty="0"/>
-              <a:t> </a:t>
-            </a:r>
-            <a:r>
-              <a:rPr lang="de-DE" dirty="0" smtClean="0"/>
-              <a:t>Erweiterbare Muster mit </a:t>
-            </a:r>
-            <a:r>
-              <a:rPr lang="de-DE" dirty="0" err="1" smtClean="0"/>
-              <a:t>Github</a:t>
-            </a:r>
-            <a:r>
-              <a:rPr lang="de-DE" dirty="0" smtClean="0"/>
-              <a:t> </a:t>
-            </a:r>
-            <a:r>
-              <a:rPr lang="de-DE" dirty="0" err="1" smtClean="0"/>
-              <a:t>Advanced</a:t>
-            </a:r>
-            <a:r>
-              <a:rPr lang="de-DE" dirty="0" smtClean="0"/>
-              <a:t> Security</a:t>
-            </a:r>
-            <a:endParaRPr lang="de-DE" dirty="0"/>
-          </a:p>
-        </p:txBody>
-      </p:sp>
-      <p:sp>
-        <p:nvSpPr>
-          <p:cNvPr id="4" name="Abgerundetes Rechteck 3"/>
-          <p:cNvSpPr/>
-          <p:nvPr/>
-        </p:nvSpPr>
-        <p:spPr>
-          <a:xfrm>
-            <a:off x="3113474" y="1983192"/>
-            <a:ext cx="1732085" cy="923193"/>
-          </a:xfrm>
-          <a:prstGeom prst="roundRect">
-            <a:avLst/>
-          </a:prstGeom>
-        </p:spPr>
-        <p:style>
-          <a:lnRef idx="2">
-            <a:schemeClr val="accent1">
-              <a:shade val="50000"/>
-            </a:schemeClr>
-          </a:lnRef>
-          <a:fillRef idx="1">
-            <a:schemeClr val="accent1"/>
-          </a:fillRef>
-          <a:effectRef idx="0">
-            <a:schemeClr val="accent1"/>
-          </a:effectRef>
-          <a:fontRef idx="minor">
-            <a:schemeClr val="lt1"/>
-          </a:fontRef>
-        </p:style>
-        <p:txBody>
-          <a:bodyPr rtlCol="0" anchor="ctr"/>
-          <a:lstStyle/>
-          <a:p>
-            <a:pPr algn="ctr"/>
-            <a:r>
-              <a:rPr lang="de-DE" dirty="0" err="1" smtClean="0"/>
-              <a:t>Secrets</a:t>
-            </a:r>
-            <a:r>
-              <a:rPr lang="de-DE" dirty="0" smtClean="0"/>
-              <a:t> sollen geheim bleiben</a:t>
-            </a:r>
-            <a:endParaRPr lang="de-DE" dirty="0"/>
-          </a:p>
-        </p:txBody>
-      </p:sp>
-      <p:sp>
-        <p:nvSpPr>
-          <p:cNvPr id="5" name="Pfeil nach rechts 4"/>
-          <p:cNvSpPr/>
-          <p:nvPr/>
-        </p:nvSpPr>
-        <p:spPr>
-          <a:xfrm>
-            <a:off x="5400587" y="2249862"/>
-            <a:ext cx="967154" cy="402512"/>
-          </a:xfrm>
-          <a:prstGeom prst="rightArrow">
-            <a:avLst/>
-          </a:prstGeom>
-        </p:spPr>
-        <p:style>
-          <a:lnRef idx="2">
-            <a:schemeClr val="accent1">
-              <a:shade val="50000"/>
-            </a:schemeClr>
-          </a:lnRef>
-          <a:fillRef idx="1">
-            <a:schemeClr val="accent1"/>
-          </a:fillRef>
-          <a:effectRef idx="0">
-            <a:schemeClr val="accent1"/>
-          </a:effectRef>
-          <a:fontRef idx="minor">
-            <a:schemeClr val="lt1"/>
-          </a:fontRef>
-        </p:style>
-        <p:txBody>
-          <a:bodyPr rtlCol="0" anchor="ctr"/>
-          <a:lstStyle/>
-          <a:p>
-            <a:pPr algn="ctr"/>
-            <a:endParaRPr lang="de-DE"/>
-          </a:p>
-        </p:txBody>
-      </p:sp>
-      <p:sp>
-        <p:nvSpPr>
-          <p:cNvPr id="7" name="Abgerundetes Rechteck 6"/>
-          <p:cNvSpPr/>
-          <p:nvPr/>
-        </p:nvSpPr>
-        <p:spPr>
-          <a:xfrm>
-            <a:off x="6922769" y="1983191"/>
-            <a:ext cx="1732085" cy="923193"/>
-          </a:xfrm>
-          <a:prstGeom prst="roundRect">
-            <a:avLst/>
-          </a:prstGeom>
-        </p:spPr>
-        <p:style>
-          <a:lnRef idx="2">
-            <a:schemeClr val="accent1">
-              <a:shade val="50000"/>
-            </a:schemeClr>
-          </a:lnRef>
-          <a:fillRef idx="1">
-            <a:schemeClr val="accent1"/>
-          </a:fillRef>
-          <a:effectRef idx="0">
-            <a:schemeClr val="accent1"/>
-          </a:effectRef>
-          <a:fontRef idx="minor">
-            <a:schemeClr val="lt1"/>
-          </a:fontRef>
-        </p:style>
-        <p:txBody>
-          <a:bodyPr rtlCol="0" anchor="ctr"/>
-          <a:lstStyle/>
-          <a:p>
-            <a:pPr algn="ctr"/>
-            <a:r>
-              <a:rPr lang="de-DE" dirty="0" err="1" smtClean="0"/>
-              <a:t>Secrets</a:t>
-            </a:r>
-            <a:r>
-              <a:rPr lang="de-DE" dirty="0" smtClean="0"/>
-              <a:t> nicht in </a:t>
-            </a:r>
-            <a:r>
-              <a:rPr lang="de-DE" dirty="0" err="1" smtClean="0"/>
-              <a:t>Repositories</a:t>
-            </a:r>
-            <a:endParaRPr lang="de-DE" dirty="0"/>
-          </a:p>
-        </p:txBody>
-      </p:sp>
-    </p:spTree>
-    <p:extLst>
-      <p:ext uri="{BB962C8B-B14F-4D97-AF65-F5344CB8AC3E}">
-        <p14:creationId xmlns:p14="http://schemas.microsoft.com/office/powerpoint/2010/main" val="2958358037"/>
-      </p:ext>
-    </p:extLst>
-  </p:cSld>
-  <p:clrMapOvr>
-    <a:masterClrMapping/>
-  </p:clrMapOvr>
+  <p:timing>
+    <p:tnLst>
+      <p:par>
+        <p:cTn id="1" dur="indefinite" restart="never" nodeType="tmRoot"/>
+      </p:par>
+    </p:tnLst>
+  </p:timing>
 </p:sld>
 </file>
 

</xml_diff>